<commit_message>
Sketchy vertlet integration exploder simulator LoL
</commit_message>
<xml_diff>
--- a/6020_Graph_2/D2D/W01/Week_01/Particle_Systems.pptx
+++ b/6020_Graph_2/D2D/W01/Week_01/Particle_Systems.pptx
@@ -5,16 +5,12 @@
     <p:sldMasterId id="2147483732" r:id="rId1"/>
   </p:sldMasterIdLst>
   <p:notesMasterIdLst>
-    <p:notesMasterId r:id="rId9"/>
+    <p:notesMasterId r:id="rId5"/>
   </p:notesMasterIdLst>
   <p:sldIdLst>
     <p:sldId id="256" r:id="rId2"/>
-    <p:sldId id="456" r:id="rId3"/>
-    <p:sldId id="457" r:id="rId4"/>
-    <p:sldId id="487" r:id="rId5"/>
-    <p:sldId id="483" r:id="rId6"/>
-    <p:sldId id="484" r:id="rId7"/>
-    <p:sldId id="473" r:id="rId8"/>
+    <p:sldId id="483" r:id="rId3"/>
+    <p:sldId id="484" r:id="rId4"/>
   </p:sldIdLst>
   <p:sldSz cx="9144000" cy="5143500" type="screen16x9"/>
   <p:notesSz cx="6858000" cy="9144000"/>
@@ -4184,7 +4180,7 @@
             </a:br>
             <a:r>
               <a:rPr lang="en-CA" sz="3600" dirty="0"/>
-              <a:t>Week 1, Day 1</a:t>
+              <a:t>Particle Systems</a:t>
             </a:r>
             <a:endParaRPr lang="en-CA" dirty="0"/>
           </a:p>
@@ -4250,38 +4246,12 @@
       </p:grpSpPr>
       <p:sp>
         <p:nvSpPr>
-          <p:cNvPr id="115714" name="Rectangle 2"/>
-          <p:cNvSpPr>
-            <a:spLocks noGrp="1" noChangeArrowheads="1"/>
+          <p:cNvPr id="7" name="Title 6"/>
+          <p:cNvSpPr>
+            <a:spLocks noGrp="1"/>
           </p:cNvSpPr>
           <p:nvPr>
             <p:ph type="title"/>
-          </p:nvPr>
-        </p:nvSpPr>
-        <p:spPr/>
-        <p:txBody>
-          <a:bodyPr/>
-          <a:lstStyle/>
-          <a:p>
-            <a:pPr eaLnBrk="1" hangingPunct="1">
-              <a:defRPr/>
-            </a:pPr>
-            <a:r>
-              <a:rPr lang="en-US" dirty="0"/>
-              <a:t>Who am I?</a:t>
-            </a:r>
-            <a:endParaRPr lang="en-CA" dirty="0"/>
-          </a:p>
-        </p:txBody>
-      </p:sp>
-      <p:sp>
-        <p:nvSpPr>
-          <p:cNvPr id="115715" name="Rectangle 3"/>
-          <p:cNvSpPr>
-            <a:spLocks noGrp="1" noChangeArrowheads="1"/>
-          </p:cNvSpPr>
-          <p:nvPr>
-            <p:ph idx="1"/>
           </p:nvPr>
         </p:nvSpPr>
         <p:spPr/>
@@ -4291,577 +4261,77 @@
           </a:bodyPr>
           <a:lstStyle/>
           <a:p>
-            <a:pPr eaLnBrk="1" hangingPunct="1"/>
-            <a:endParaRPr lang="en-US" dirty="0"/>
-          </a:p>
-          <a:p>
-            <a:pPr eaLnBrk="1" hangingPunct="1"/>
-            <a:r>
-              <a:rPr lang="en-US" dirty="0"/>
-              <a:t>Michael Feeney Jr.</a:t>
-            </a:r>
-          </a:p>
-          <a:p>
-            <a:pPr eaLnBrk="1" hangingPunct="1"/>
-            <a:r>
-              <a:rPr lang="en-US" dirty="0"/>
-              <a:t>G3001</a:t>
-            </a:r>
-          </a:p>
-          <a:p>
-            <a:pPr eaLnBrk="1" hangingPunct="1"/>
-            <a:r>
-              <a:rPr lang="en-US" dirty="0"/>
-              <a:t>mfeeney@fanshawec.ca</a:t>
-            </a:r>
-          </a:p>
-          <a:p>
-            <a:pPr eaLnBrk="1" hangingPunct="1"/>
-            <a:r>
-              <a:rPr lang="en-US" dirty="0"/>
-              <a:t>mfeeney@fanshaweonline.ca (slower response)</a:t>
-            </a:r>
-          </a:p>
-        </p:txBody>
-      </p:sp>
-      <p:sp>
-        <p:nvSpPr>
-          <p:cNvPr id="115718" name="AutoShape 6"/>
-          <p:cNvSpPr>
-            <a:spLocks noChangeArrowheads="1"/>
-          </p:cNvSpPr>
-          <p:nvPr/>
-        </p:nvSpPr>
-        <p:spPr bwMode="auto">
-          <a:xfrm>
-            <a:off x="8534400" y="4800600"/>
-            <a:ext cx="609600" cy="342900"/>
-          </a:xfrm>
-          <a:prstGeom prst="rightArrow">
-            <a:avLst>
-              <a:gd name="adj1" fmla="val 50000"/>
-              <a:gd name="adj2" fmla="val 33333"/>
-            </a:avLst>
-          </a:prstGeom>
-          <a:noFill/>
-          <a:ln w="19050">
-            <a:solidFill>
-              <a:srgbClr val="969696"/>
-            </a:solidFill>
-            <a:miter lim="800000"/>
-            <a:headEnd/>
-            <a:tailEnd/>
-          </a:ln>
-        </p:spPr>
-        <p:txBody>
-          <a:bodyPr wrap="none" anchor="ctr"/>
-          <a:lstStyle/>
-          <a:p>
-            <a:endParaRPr lang="en-CA"/>
-          </a:p>
-        </p:txBody>
-      </p:sp>
-      <p:pic>
-        <p:nvPicPr>
-          <p:cNvPr id="115719" name="Picture 7" descr="C:\S1_INFO-6019 Physics and Simulation Level 1 (Michael)\D2D\Week_01\Day_1\Resources\34530.gif"/>
-          <p:cNvPicPr>
-            <a:picLocks noChangeAspect="1" noChangeArrowheads="1"/>
-          </p:cNvPicPr>
-          <p:nvPr/>
-        </p:nvPicPr>
-        <p:blipFill>
-          <a:blip r:embed="rId2" cstate="print"/>
-          <a:srcRect/>
-          <a:stretch>
-            <a:fillRect/>
-          </a:stretch>
-        </p:blipFill>
-        <p:spPr bwMode="auto">
-          <a:xfrm>
-            <a:off x="5029200" y="514351"/>
-            <a:ext cx="2305050" cy="1728788"/>
-          </a:xfrm>
-          <a:prstGeom prst="rect">
-            <a:avLst/>
-          </a:prstGeom>
-          <a:noFill/>
-          <a:ln w="9525">
-            <a:noFill/>
-            <a:miter lim="800000"/>
-            <a:headEnd/>
-            <a:tailEnd/>
-          </a:ln>
-        </p:spPr>
-      </p:pic>
-      <p:sp>
-        <p:nvSpPr>
-          <p:cNvPr id="10" name="Rounded Rectangular Callout 9"/>
-          <p:cNvSpPr>
-            <a:spLocks noChangeArrowheads="1"/>
-          </p:cNvSpPr>
-          <p:nvPr/>
-        </p:nvSpPr>
-        <p:spPr bwMode="auto">
-          <a:xfrm>
-            <a:off x="6781800" y="514350"/>
-            <a:ext cx="2209800" cy="1028700"/>
-          </a:xfrm>
-          <a:prstGeom prst="wedgeRoundRectCallout">
-            <a:avLst>
-              <a:gd name="adj1" fmla="val -65000"/>
-              <a:gd name="adj2" fmla="val 40949"/>
-              <a:gd name="adj3" fmla="val 16667"/>
-            </a:avLst>
-          </a:prstGeom>
-          <a:solidFill>
-            <a:srgbClr val="00B8FF"/>
-          </a:solidFill>
-          <a:ln w="9525" algn="ctr">
-            <a:solidFill>
-              <a:schemeClr val="tx1"/>
-            </a:solidFill>
-            <a:round/>
-            <a:headEnd/>
-            <a:tailEnd/>
-          </a:ln>
-        </p:spPr>
-        <p:txBody>
-          <a:bodyPr/>
-          <a:lstStyle/>
-          <a:p>
-            <a:pPr algn="ctr"/>
-            <a:r>
-              <a:rPr lang="en-CA"/>
-              <a:t>Oh my, how convenient is that, I ask you?</a:t>
-            </a:r>
+            <a:r>
+              <a:rPr lang="en-CA" dirty="0"/>
+              <a:t>The </a:t>
+            </a:r>
+            <a:r>
+              <a:rPr lang="en-CA" dirty="0" err="1"/>
+              <a:t>deetz</a:t>
+            </a:r>
+            <a:r>
+              <a:rPr lang="en-CA" dirty="0"/>
+              <a:t>: Particle systems</a:t>
+            </a:r>
+          </a:p>
+        </p:txBody>
+      </p:sp>
+      <p:sp>
+        <p:nvSpPr>
+          <p:cNvPr id="8" name="Content Placeholder 7"/>
+          <p:cNvSpPr>
+            <a:spLocks noGrp="1"/>
+          </p:cNvSpPr>
+          <p:nvPr>
+            <p:ph idx="1"/>
+          </p:nvPr>
+        </p:nvSpPr>
+        <p:spPr/>
+        <p:txBody>
+          <a:bodyPr>
+            <a:normAutofit/>
+          </a:bodyPr>
+          <a:lstStyle/>
+          <a:p>
+            <a:r>
+              <a:rPr lang="en-CA" sz="2800" dirty="0"/>
+              <a:t>A whole bunch (100s, 1000s, millions?) of them</a:t>
+            </a:r>
+          </a:p>
+          <a:p>
+            <a:r>
+              <a:rPr lang="en-CA" sz="2800" dirty="0"/>
+              <a:t>Creation and destruction is an issue (new)</a:t>
+            </a:r>
+          </a:p>
+          <a:p>
+            <a:pPr lvl="1"/>
+            <a:r>
+              <a:rPr lang="en-CA" sz="2400" dirty="0"/>
+              <a:t>“pool” or potential particles (or “dead”/”alive”)</a:t>
+            </a:r>
+          </a:p>
+          <a:p>
+            <a:r>
+              <a:rPr lang="en-CA" sz="2800" dirty="0"/>
+              <a:t>Place a mesh where the point particles are or place an aligned textured “imposter” </a:t>
+            </a:r>
+          </a:p>
+          <a:p>
+            <a:endParaRPr lang="en-CA" dirty="0"/>
           </a:p>
         </p:txBody>
       </p:sp>
     </p:spTree>
+    <p:extLst>
+      <p:ext uri="{BB962C8B-B14F-4D97-AF65-F5344CB8AC3E}">
+        <p14:creationId xmlns:p14="http://schemas.microsoft.com/office/powerpoint/2010/main" val="1483520627"/>
+      </p:ext>
+    </p:extLst>
   </p:cSld>
   <p:clrMapOvr>
     <a:masterClrMapping/>
   </p:clrMapOvr>
-  <p:timing>
-    <p:tnLst>
-      <p:par>
-        <p:cTn id="1" dur="indefinite" restart="never" nodeType="tmRoot">
-          <p:childTnLst>
-            <p:seq concurrent="1" nextAc="seek">
-              <p:cTn id="2" dur="indefinite" nodeType="mainSeq">
-                <p:childTnLst>
-                  <p:par>
-                    <p:cTn id="3" fill="hold">
-                      <p:stCondLst>
-                        <p:cond delay="indefinite"/>
-                      </p:stCondLst>
-                      <p:childTnLst>
-                        <p:par>
-                          <p:cTn id="4" fill="hold">
-                            <p:stCondLst>
-                              <p:cond delay="0"/>
-                            </p:stCondLst>
-                            <p:childTnLst>
-                              <p:par>
-                                <p:cTn id="5" presetID="8" presetClass="entr" presetSubtype="16" fill="hold" grpId="0" nodeType="clickEffect">
-                                  <p:stCondLst>
-                                    <p:cond delay="0"/>
-                                  </p:stCondLst>
-                                  <p:childTnLst>
-                                    <p:set>
-                                      <p:cBhvr>
-                                        <p:cTn id="6" dur="1" fill="hold">
-                                          <p:stCondLst>
-                                            <p:cond delay="0"/>
-                                          </p:stCondLst>
-                                        </p:cTn>
-                                        <p:tgtEl>
-                                          <p:spTgt spid="115715">
-                                            <p:txEl>
-                                              <p:pRg st="1" end="1"/>
-                                            </p:txEl>
-                                          </p:spTgt>
-                                        </p:tgtEl>
-                                        <p:attrNameLst>
-                                          <p:attrName>style.visibility</p:attrName>
-                                        </p:attrNameLst>
-                                      </p:cBhvr>
-                                      <p:to>
-                                        <p:strVal val="visible"/>
-                                      </p:to>
-                                    </p:set>
-                                    <p:animEffect transition="in" filter="diamond(in)">
-                                      <p:cBhvr>
-                                        <p:cTn id="7" dur="500"/>
-                                        <p:tgtEl>
-                                          <p:spTgt spid="115715">
-                                            <p:txEl>
-                                              <p:pRg st="1" end="1"/>
-                                            </p:txEl>
-                                          </p:spTgt>
-                                        </p:tgtEl>
-                                      </p:cBhvr>
-                                    </p:animEffect>
-                                  </p:childTnLst>
-                                </p:cTn>
-                              </p:par>
-                            </p:childTnLst>
-                          </p:cTn>
-                        </p:par>
-                      </p:childTnLst>
-                    </p:cTn>
-                  </p:par>
-                  <p:par>
-                    <p:cTn id="8" fill="hold">
-                      <p:stCondLst>
-                        <p:cond delay="indefinite"/>
-                      </p:stCondLst>
-                      <p:childTnLst>
-                        <p:par>
-                          <p:cTn id="9" fill="hold">
-                            <p:stCondLst>
-                              <p:cond delay="0"/>
-                            </p:stCondLst>
-                            <p:childTnLst>
-                              <p:par>
-                                <p:cTn id="10" presetID="8" presetClass="entr" presetSubtype="16" fill="hold" grpId="0" nodeType="clickEffect">
-                                  <p:stCondLst>
-                                    <p:cond delay="0"/>
-                                  </p:stCondLst>
-                                  <p:childTnLst>
-                                    <p:set>
-                                      <p:cBhvr>
-                                        <p:cTn id="11" dur="1" fill="hold">
-                                          <p:stCondLst>
-                                            <p:cond delay="0"/>
-                                          </p:stCondLst>
-                                        </p:cTn>
-                                        <p:tgtEl>
-                                          <p:spTgt spid="115715">
-                                            <p:txEl>
-                                              <p:pRg st="2" end="2"/>
-                                            </p:txEl>
-                                          </p:spTgt>
-                                        </p:tgtEl>
-                                        <p:attrNameLst>
-                                          <p:attrName>style.visibility</p:attrName>
-                                        </p:attrNameLst>
-                                      </p:cBhvr>
-                                      <p:to>
-                                        <p:strVal val="visible"/>
-                                      </p:to>
-                                    </p:set>
-                                    <p:animEffect transition="in" filter="diamond(in)">
-                                      <p:cBhvr>
-                                        <p:cTn id="12" dur="500"/>
-                                        <p:tgtEl>
-                                          <p:spTgt spid="115715">
-                                            <p:txEl>
-                                              <p:pRg st="2" end="2"/>
-                                            </p:txEl>
-                                          </p:spTgt>
-                                        </p:tgtEl>
-                                      </p:cBhvr>
-                                    </p:animEffect>
-                                  </p:childTnLst>
-                                </p:cTn>
-                              </p:par>
-                            </p:childTnLst>
-                          </p:cTn>
-                        </p:par>
-                      </p:childTnLst>
-                    </p:cTn>
-                  </p:par>
-                  <p:par>
-                    <p:cTn id="13" fill="hold">
-                      <p:stCondLst>
-                        <p:cond delay="indefinite"/>
-                      </p:stCondLst>
-                      <p:childTnLst>
-                        <p:par>
-                          <p:cTn id="14" fill="hold">
-                            <p:stCondLst>
-                              <p:cond delay="0"/>
-                            </p:stCondLst>
-                            <p:childTnLst>
-                              <p:par>
-                                <p:cTn id="15" presetID="8" presetClass="entr" presetSubtype="16" fill="hold" grpId="0" nodeType="clickEffect">
-                                  <p:stCondLst>
-                                    <p:cond delay="0"/>
-                                  </p:stCondLst>
-                                  <p:childTnLst>
-                                    <p:set>
-                                      <p:cBhvr>
-                                        <p:cTn id="16" dur="1" fill="hold">
-                                          <p:stCondLst>
-                                            <p:cond delay="0"/>
-                                          </p:stCondLst>
-                                        </p:cTn>
-                                        <p:tgtEl>
-                                          <p:spTgt spid="115715">
-                                            <p:txEl>
-                                              <p:pRg st="3" end="3"/>
-                                            </p:txEl>
-                                          </p:spTgt>
-                                        </p:tgtEl>
-                                        <p:attrNameLst>
-                                          <p:attrName>style.visibility</p:attrName>
-                                        </p:attrNameLst>
-                                      </p:cBhvr>
-                                      <p:to>
-                                        <p:strVal val="visible"/>
-                                      </p:to>
-                                    </p:set>
-                                    <p:animEffect transition="in" filter="diamond(in)">
-                                      <p:cBhvr>
-                                        <p:cTn id="17" dur="500"/>
-                                        <p:tgtEl>
-                                          <p:spTgt spid="115715">
-                                            <p:txEl>
-                                              <p:pRg st="3" end="3"/>
-                                            </p:txEl>
-                                          </p:spTgt>
-                                        </p:tgtEl>
-                                      </p:cBhvr>
-                                    </p:animEffect>
-                                  </p:childTnLst>
-                                </p:cTn>
-                              </p:par>
-                            </p:childTnLst>
-                          </p:cTn>
-                        </p:par>
-                      </p:childTnLst>
-                    </p:cTn>
-                  </p:par>
-                  <p:par>
-                    <p:cTn id="18" fill="hold">
-                      <p:stCondLst>
-                        <p:cond delay="indefinite"/>
-                      </p:stCondLst>
-                      <p:childTnLst>
-                        <p:par>
-                          <p:cTn id="19" fill="hold">
-                            <p:stCondLst>
-                              <p:cond delay="0"/>
-                            </p:stCondLst>
-                            <p:childTnLst>
-                              <p:par>
-                                <p:cTn id="20" presetID="8" presetClass="entr" presetSubtype="16" fill="hold" grpId="0" nodeType="clickEffect">
-                                  <p:stCondLst>
-                                    <p:cond delay="0"/>
-                                  </p:stCondLst>
-                                  <p:childTnLst>
-                                    <p:set>
-                                      <p:cBhvr>
-                                        <p:cTn id="21" dur="1" fill="hold">
-                                          <p:stCondLst>
-                                            <p:cond delay="0"/>
-                                          </p:stCondLst>
-                                        </p:cTn>
-                                        <p:tgtEl>
-                                          <p:spTgt spid="115715">
-                                            <p:txEl>
-                                              <p:pRg st="4" end="4"/>
-                                            </p:txEl>
-                                          </p:spTgt>
-                                        </p:tgtEl>
-                                        <p:attrNameLst>
-                                          <p:attrName>style.visibility</p:attrName>
-                                        </p:attrNameLst>
-                                      </p:cBhvr>
-                                      <p:to>
-                                        <p:strVal val="visible"/>
-                                      </p:to>
-                                    </p:set>
-                                    <p:animEffect transition="in" filter="diamond(in)">
-                                      <p:cBhvr>
-                                        <p:cTn id="22" dur="500"/>
-                                        <p:tgtEl>
-                                          <p:spTgt spid="115715">
-                                            <p:txEl>
-                                              <p:pRg st="4" end="4"/>
-                                            </p:txEl>
-                                          </p:spTgt>
-                                        </p:tgtEl>
-                                      </p:cBhvr>
-                                    </p:animEffect>
-                                  </p:childTnLst>
-                                </p:cTn>
-                              </p:par>
-                            </p:childTnLst>
-                          </p:cTn>
-                        </p:par>
-                        <p:par>
-                          <p:cTn id="23" fill="hold">
-                            <p:stCondLst>
-                              <p:cond delay="500"/>
-                            </p:stCondLst>
-                            <p:childTnLst>
-                              <p:par>
-                                <p:cTn id="24" presetID="5" presetClass="entr" presetSubtype="10" fill="hold" nodeType="afterEffect">
-                                  <p:stCondLst>
-                                    <p:cond delay="0"/>
-                                  </p:stCondLst>
-                                  <p:childTnLst>
-                                    <p:set>
-                                      <p:cBhvr>
-                                        <p:cTn id="25" dur="1" fill="hold">
-                                          <p:stCondLst>
-                                            <p:cond delay="0"/>
-                                          </p:stCondLst>
-                                        </p:cTn>
-                                        <p:tgtEl>
-                                          <p:spTgt spid="115719"/>
-                                        </p:tgtEl>
-                                        <p:attrNameLst>
-                                          <p:attrName>style.visibility</p:attrName>
-                                        </p:attrNameLst>
-                                      </p:cBhvr>
-                                      <p:to>
-                                        <p:strVal val="visible"/>
-                                      </p:to>
-                                    </p:set>
-                                    <p:animEffect transition="in" filter="checkerboard(across)">
-                                      <p:cBhvr>
-                                        <p:cTn id="26" dur="500"/>
-                                        <p:tgtEl>
-                                          <p:spTgt spid="115719"/>
-                                        </p:tgtEl>
-                                      </p:cBhvr>
-                                    </p:animEffect>
-                                  </p:childTnLst>
-                                </p:cTn>
-                              </p:par>
-                            </p:childTnLst>
-                          </p:cTn>
-                        </p:par>
-                        <p:par>
-                          <p:cTn id="27" fill="hold">
-                            <p:stCondLst>
-                              <p:cond delay="1000"/>
-                            </p:stCondLst>
-                            <p:childTnLst>
-                              <p:par>
-                                <p:cTn id="28" presetID="5" presetClass="entr" presetSubtype="10" fill="hold" grpId="0" nodeType="afterEffect">
-                                  <p:stCondLst>
-                                    <p:cond delay="0"/>
-                                  </p:stCondLst>
-                                  <p:childTnLst>
-                                    <p:set>
-                                      <p:cBhvr>
-                                        <p:cTn id="29" dur="1" fill="hold">
-                                          <p:stCondLst>
-                                            <p:cond delay="0"/>
-                                          </p:stCondLst>
-                                        </p:cTn>
-                                        <p:tgtEl>
-                                          <p:spTgt spid="10"/>
-                                        </p:tgtEl>
-                                        <p:attrNameLst>
-                                          <p:attrName>style.visibility</p:attrName>
-                                        </p:attrNameLst>
-                                      </p:cBhvr>
-                                      <p:to>
-                                        <p:strVal val="visible"/>
-                                      </p:to>
-                                    </p:set>
-                                    <p:animEffect transition="in" filter="checkerboard(across)">
-                                      <p:cBhvr>
-                                        <p:cTn id="30" dur="500"/>
-                                        <p:tgtEl>
-                                          <p:spTgt spid="10"/>
-                                        </p:tgtEl>
-                                      </p:cBhvr>
-                                    </p:animEffect>
-                                  </p:childTnLst>
-                                </p:cTn>
-                              </p:par>
-                            </p:childTnLst>
-                          </p:cTn>
-                        </p:par>
-                      </p:childTnLst>
-                    </p:cTn>
-                  </p:par>
-                  <p:par>
-                    <p:cTn id="31" fill="hold">
-                      <p:stCondLst>
-                        <p:cond delay="indefinite"/>
-                      </p:stCondLst>
-                      <p:childTnLst>
-                        <p:par>
-                          <p:cTn id="32" fill="hold">
-                            <p:stCondLst>
-                              <p:cond delay="0"/>
-                            </p:stCondLst>
-                            <p:childTnLst>
-                              <p:par>
-                                <p:cTn id="33" presetID="10" presetClass="entr" presetSubtype="0" fill="hold" grpId="0" nodeType="clickEffect">
-                                  <p:stCondLst>
-                                    <p:cond delay="0"/>
-                                  </p:stCondLst>
-                                  <p:childTnLst>
-                                    <p:set>
-                                      <p:cBhvr>
-                                        <p:cTn id="34" dur="1" fill="hold">
-                                          <p:stCondLst>
-                                            <p:cond delay="0"/>
-                                          </p:stCondLst>
-                                        </p:cTn>
-                                        <p:tgtEl>
-                                          <p:spTgt spid="115718"/>
-                                        </p:tgtEl>
-                                        <p:attrNameLst>
-                                          <p:attrName>style.visibility</p:attrName>
-                                        </p:attrNameLst>
-                                      </p:cBhvr>
-                                      <p:to>
-                                        <p:strVal val="visible"/>
-                                      </p:to>
-                                    </p:set>
-                                    <p:animEffect transition="in" filter="fade">
-                                      <p:cBhvr>
-                                        <p:cTn id="35" dur="500"/>
-                                        <p:tgtEl>
-                                          <p:spTgt spid="115718"/>
-                                        </p:tgtEl>
-                                      </p:cBhvr>
-                                    </p:animEffect>
-                                  </p:childTnLst>
-                                </p:cTn>
-                              </p:par>
-                            </p:childTnLst>
-                          </p:cTn>
-                        </p:par>
-                      </p:childTnLst>
-                    </p:cTn>
-                  </p:par>
-                </p:childTnLst>
-              </p:cTn>
-              <p:prevCondLst>
-                <p:cond evt="onPrev" delay="0">
-                  <p:tgtEl>
-                    <p:sldTgt/>
-                  </p:tgtEl>
-                </p:cond>
-              </p:prevCondLst>
-              <p:nextCondLst>
-                <p:cond evt="onNext" delay="0">
-                  <p:tgtEl>
-                    <p:sldTgt/>
-                  </p:tgtEl>
-                </p:cond>
-              </p:nextCondLst>
-            </p:seq>
-          </p:childTnLst>
-        </p:cTn>
-      </p:par>
-    </p:tnLst>
-    <p:bldLst>
-      <p:bldP spid="115715" grpId="0" build="p"/>
-      <p:bldP spid="115718" grpId="0" animBg="1"/>
-      <p:bldP spid="10" grpId="0" animBg="1"/>
-    </p:bldLst>
-  </p:timing>
 </p:sld>
 </file>
 
@@ -4884,37 +4354,12 @@
       </p:grpSpPr>
       <p:sp>
         <p:nvSpPr>
-          <p:cNvPr id="2" name="Title 1"/>
+          <p:cNvPr id="7" name="Title 6"/>
           <p:cNvSpPr>
             <a:spLocks noGrp="1"/>
           </p:cNvSpPr>
           <p:nvPr>
             <p:ph type="title"/>
-          </p:nvPr>
-        </p:nvSpPr>
-        <p:spPr/>
-        <p:txBody>
-          <a:bodyPr/>
-          <a:lstStyle/>
-          <a:p>
-            <a:pPr>
-              <a:defRPr/>
-            </a:pPr>
-            <a:r>
-              <a:rPr lang="en-CA" dirty="0"/>
-              <a:t>What’s this course all about?</a:t>
-            </a:r>
-          </a:p>
-        </p:txBody>
-      </p:sp>
-      <p:sp>
-        <p:nvSpPr>
-          <p:cNvPr id="3" name="Content Placeholder 2"/>
-          <p:cNvSpPr>
-            <a:spLocks noGrp="1"/>
-          </p:cNvSpPr>
-          <p:nvPr>
-            <p:ph idx="1"/>
           </p:nvPr>
         </p:nvSpPr>
         <p:spPr/>
@@ -4925,2949 +4370,81 @@
           <a:lstStyle/>
           <a:p>
             <a:r>
+              <a:rPr lang="en-CA" dirty="0"/>
+              <a:t>Terms</a:t>
+            </a:r>
+          </a:p>
+        </p:txBody>
+      </p:sp>
+      <p:sp>
+        <p:nvSpPr>
+          <p:cNvPr id="8" name="Content Placeholder 7"/>
+          <p:cNvSpPr>
+            <a:spLocks noGrp="1"/>
+          </p:cNvSpPr>
+          <p:nvPr>
+            <p:ph idx="1"/>
+          </p:nvPr>
+        </p:nvSpPr>
+        <p:spPr/>
+        <p:txBody>
+          <a:bodyPr>
+            <a:normAutofit lnSpcReduction="10000"/>
+          </a:bodyPr>
+          <a:lstStyle/>
+          <a:p>
+            <a:r>
+              <a:rPr lang="en-CA" sz="2800" dirty="0"/>
+              <a:t>Emitter: where the particles come from</a:t>
+            </a:r>
+          </a:p>
+          <a:p>
+            <a:pPr lvl="1"/>
+            <a:r>
               <a:rPr lang="en-CA" sz="2400" dirty="0"/>
-              <a:t>This course is a continuation of 'Graphics Level 1' exploring more advanced topics such as: bump mapping, advanced shadow generation, particle and water simulation and rendering, dynamic reflections, blur, bloom, fur and hair simulation, high-dynamic range rendering, and non-graphical programming of GPUs. </a:t>
-            </a:r>
-          </a:p>
-        </p:txBody>
-      </p:sp>
-      <p:sp>
-        <p:nvSpPr>
-          <p:cNvPr id="4" name="AutoShape 6"/>
-          <p:cNvSpPr>
-            <a:spLocks noChangeArrowheads="1"/>
-          </p:cNvSpPr>
-          <p:nvPr/>
-        </p:nvSpPr>
-        <p:spPr bwMode="auto">
-          <a:xfrm>
-            <a:off x="8534400" y="4800600"/>
-            <a:ext cx="609600" cy="342900"/>
-          </a:xfrm>
-          <a:prstGeom prst="rightArrow">
-            <a:avLst>
-              <a:gd name="adj1" fmla="val 50000"/>
-              <a:gd name="adj2" fmla="val 33333"/>
-            </a:avLst>
-          </a:prstGeom>
-          <a:noFill/>
-          <a:ln w="19050">
-            <a:solidFill>
-              <a:srgbClr val="969696"/>
-            </a:solidFill>
-            <a:miter lim="800000"/>
-            <a:headEnd/>
-            <a:tailEnd/>
-          </a:ln>
-        </p:spPr>
-        <p:txBody>
-          <a:bodyPr wrap="none" anchor="ctr"/>
-          <a:lstStyle/>
-          <a:p>
-            <a:endParaRPr lang="en-CA"/>
-          </a:p>
-        </p:txBody>
-      </p:sp>
-    </p:spTree>
-  </p:cSld>
-  <p:clrMapOvr>
-    <a:masterClrMapping/>
-  </p:clrMapOvr>
-  <p:timing>
-    <p:tnLst>
-      <p:par>
-        <p:cTn id="1" dur="indefinite" restart="never" nodeType="tmRoot">
-          <p:childTnLst>
-            <p:seq concurrent="1" nextAc="seek">
-              <p:cTn id="2" dur="indefinite" nodeType="mainSeq">
-                <p:childTnLst>
-                  <p:par>
-                    <p:cTn id="3" fill="hold">
-                      <p:stCondLst>
-                        <p:cond delay="indefinite"/>
-                      </p:stCondLst>
-                      <p:childTnLst>
-                        <p:par>
-                          <p:cTn id="4" fill="hold">
-                            <p:stCondLst>
-                              <p:cond delay="0"/>
-                            </p:stCondLst>
-                            <p:childTnLst>
-                              <p:par>
-                                <p:cTn id="5" presetID="5" presetClass="entr" presetSubtype="10" fill="hold" grpId="0" nodeType="clickEffect">
-                                  <p:stCondLst>
-                                    <p:cond delay="0"/>
-                                  </p:stCondLst>
-                                  <p:childTnLst>
-                                    <p:set>
-                                      <p:cBhvr>
-                                        <p:cTn id="6" dur="1" fill="hold">
-                                          <p:stCondLst>
-                                            <p:cond delay="0"/>
-                                          </p:stCondLst>
-                                        </p:cTn>
-                                        <p:tgtEl>
-                                          <p:spTgt spid="3">
-                                            <p:txEl>
-                                              <p:pRg st="0" end="0"/>
-                                            </p:txEl>
-                                          </p:spTgt>
-                                        </p:tgtEl>
-                                        <p:attrNameLst>
-                                          <p:attrName>style.visibility</p:attrName>
-                                        </p:attrNameLst>
-                                      </p:cBhvr>
-                                      <p:to>
-                                        <p:strVal val="visible"/>
-                                      </p:to>
-                                    </p:set>
-                                    <p:animEffect transition="in" filter="checkerboard(across)">
-                                      <p:cBhvr>
-                                        <p:cTn id="7" dur="500"/>
-                                        <p:tgtEl>
-                                          <p:spTgt spid="3">
-                                            <p:txEl>
-                                              <p:pRg st="0" end="0"/>
-                                            </p:txEl>
-                                          </p:spTgt>
-                                        </p:tgtEl>
-                                      </p:cBhvr>
-                                    </p:animEffect>
-                                  </p:childTnLst>
-                                </p:cTn>
-                              </p:par>
-                            </p:childTnLst>
-                          </p:cTn>
-                        </p:par>
-                      </p:childTnLst>
-                    </p:cTn>
-                  </p:par>
-                  <p:par>
-                    <p:cTn id="8" fill="hold">
-                      <p:stCondLst>
-                        <p:cond delay="indefinite"/>
-                      </p:stCondLst>
-                      <p:childTnLst>
-                        <p:par>
-                          <p:cTn id="9" fill="hold">
-                            <p:stCondLst>
-                              <p:cond delay="0"/>
-                            </p:stCondLst>
-                            <p:childTnLst>
-                              <p:par>
-                                <p:cTn id="10" presetID="10" presetClass="entr" presetSubtype="0" fill="hold" grpId="0" nodeType="clickEffect">
-                                  <p:stCondLst>
-                                    <p:cond delay="0"/>
-                                  </p:stCondLst>
-                                  <p:childTnLst>
-                                    <p:set>
-                                      <p:cBhvr>
-                                        <p:cTn id="11" dur="1" fill="hold">
-                                          <p:stCondLst>
-                                            <p:cond delay="0"/>
-                                          </p:stCondLst>
-                                        </p:cTn>
-                                        <p:tgtEl>
-                                          <p:spTgt spid="4"/>
-                                        </p:tgtEl>
-                                        <p:attrNameLst>
-                                          <p:attrName>style.visibility</p:attrName>
-                                        </p:attrNameLst>
-                                      </p:cBhvr>
-                                      <p:to>
-                                        <p:strVal val="visible"/>
-                                      </p:to>
-                                    </p:set>
-                                    <p:animEffect transition="in" filter="fade">
-                                      <p:cBhvr>
-                                        <p:cTn id="12" dur="500"/>
-                                        <p:tgtEl>
-                                          <p:spTgt spid="4"/>
-                                        </p:tgtEl>
-                                      </p:cBhvr>
-                                    </p:animEffect>
-                                  </p:childTnLst>
-                                </p:cTn>
-                              </p:par>
-                            </p:childTnLst>
-                          </p:cTn>
-                        </p:par>
-                      </p:childTnLst>
-                    </p:cTn>
-                  </p:par>
-                </p:childTnLst>
-              </p:cTn>
-              <p:prevCondLst>
-                <p:cond evt="onPrev" delay="0">
-                  <p:tgtEl>
-                    <p:sldTgt/>
-                  </p:tgtEl>
-                </p:cond>
-              </p:prevCondLst>
-              <p:nextCondLst>
-                <p:cond evt="onNext" delay="0">
-                  <p:tgtEl>
-                    <p:sldTgt/>
-                  </p:tgtEl>
-                </p:cond>
-              </p:nextCondLst>
-            </p:seq>
-          </p:childTnLst>
-        </p:cTn>
-      </p:par>
-    </p:tnLst>
-    <p:bldLst>
-      <p:bldP spid="3" grpId="0" build="p"/>
-      <p:bldP spid="4" grpId="0" animBg="1"/>
-    </p:bldLst>
-  </p:timing>
-</p:sld>
-</file>
-
-<file path=ppt/slides/slide4.xml><?xml version="1.0" encoding="utf-8"?>
-<p:sld xmlns:a="http://schemas.openxmlformats.org/drawingml/2006/main" xmlns:r="http://schemas.openxmlformats.org/officeDocument/2006/relationships" xmlns:p="http://schemas.openxmlformats.org/presentationml/2006/main">
-  <p:cSld>
-    <p:spTree>
-      <p:nvGrpSpPr>
-        <p:cNvPr id="1" name=""/>
-        <p:cNvGrpSpPr/>
-        <p:nvPr/>
-      </p:nvGrpSpPr>
-      <p:grpSpPr>
-        <a:xfrm>
-          <a:off x="0" y="0"/>
-          <a:ext cx="0" cy="0"/>
-          <a:chOff x="0" y="0"/>
-          <a:chExt cx="0" cy="0"/>
-        </a:xfrm>
-      </p:grpSpPr>
-      <p:sp>
-        <p:nvSpPr>
-          <p:cNvPr id="2" name="Title 1"/>
-          <p:cNvSpPr>
-            <a:spLocks noGrp="1"/>
-          </p:cNvSpPr>
-          <p:nvPr>
-            <p:ph type="title"/>
-          </p:nvPr>
-        </p:nvSpPr>
-        <p:spPr/>
-        <p:txBody>
-          <a:bodyPr>
-            <a:normAutofit/>
-          </a:bodyPr>
-          <a:lstStyle/>
-          <a:p>
-            <a:pPr>
-              <a:defRPr/>
-            </a:pPr>
-            <a:r>
-              <a:rPr lang="en-CA" dirty="0"/>
-              <a:t>Proposed schedule (2024)</a:t>
-            </a:r>
-          </a:p>
-        </p:txBody>
-      </p:sp>
-      <p:graphicFrame>
-        <p:nvGraphicFramePr>
-          <p:cNvPr id="9" name="Table 8"/>
-          <p:cNvGraphicFramePr>
-            <a:graphicFrameLocks noGrp="1"/>
-          </p:cNvGraphicFramePr>
-          <p:nvPr>
-            <p:extLst>
-              <p:ext uri="{D42A27DB-BD31-4B8C-83A1-F6EECF244321}">
-                <p14:modId xmlns:p14="http://schemas.microsoft.com/office/powerpoint/2010/main" val="2556164488"/>
-              </p:ext>
-            </p:extLst>
-          </p:nvPr>
-        </p:nvGraphicFramePr>
-        <p:xfrm>
-          <a:off x="152400" y="1276350"/>
-          <a:ext cx="8686801" cy="3108015"/>
-        </p:xfrm>
-        <a:graphic>
-          <a:graphicData uri="http://schemas.openxmlformats.org/drawingml/2006/table">
-            <a:tbl>
-              <a:tblPr/>
-              <a:tblGrid>
-                <a:gridCol w="990600">
-                  <a:extLst>
-                    <a:ext uri="{9D8B030D-6E8A-4147-A177-3AD203B41FA5}">
-                      <a16:colId xmlns:a16="http://schemas.microsoft.com/office/drawing/2014/main" val="20000"/>
-                    </a:ext>
-                  </a:extLst>
-                </a:gridCol>
-                <a:gridCol w="7696201">
-                  <a:extLst>
-                    <a:ext uri="{9D8B030D-6E8A-4147-A177-3AD203B41FA5}">
-                      <a16:colId xmlns:a16="http://schemas.microsoft.com/office/drawing/2014/main" val="20001"/>
-                    </a:ext>
-                  </a:extLst>
-                </a:gridCol>
-              </a:tblGrid>
-              <a:tr h="199580">
-                <a:tc>
-                  <a:txBody>
-                    <a:bodyPr/>
-                    <a:lstStyle/>
-                    <a:p>
-                      <a:pPr marL="0" marR="0" indent="0" algn="ctr" defTabSz="914400" rtl="0" eaLnBrk="1" fontAlgn="auto" latinLnBrk="0" hangingPunct="1">
-                        <a:lnSpc>
-                          <a:spcPct val="115000"/>
-                        </a:lnSpc>
-                        <a:spcBef>
-                          <a:spcPts val="0"/>
-                        </a:spcBef>
-                        <a:spcAft>
-                          <a:spcPts val="0"/>
-                        </a:spcAft>
-                        <a:buClrTx/>
-                        <a:buSzTx/>
-                        <a:buFontTx/>
-                        <a:buNone/>
-                        <a:tabLst/>
-                        <a:defRPr/>
-                      </a:pPr>
-                      <a:r>
-                        <a:rPr lang="en-CA" sz="1100" dirty="0">
-                          <a:latin typeface="Calibri"/>
-                          <a:ea typeface="Calibri"/>
-                          <a:cs typeface="Times New Roman"/>
-                        </a:rPr>
-                        <a:t>Week 1</a:t>
-                      </a:r>
-                    </a:p>
-                  </a:txBody>
-                  <a:tcPr marL="68580" marR="68580" marT="0" marB="0">
-                    <a:lnL w="12700" cap="flat" cmpd="sng" algn="ctr">
-                      <a:solidFill>
-                        <a:srgbClr val="000000"/>
-                      </a:solidFill>
-                      <a:prstDash val="solid"/>
-                      <a:round/>
-                      <a:headEnd type="none" w="med" len="med"/>
-                      <a:tailEnd type="none" w="med" len="med"/>
-                    </a:lnL>
-                    <a:lnR w="12700" cap="flat" cmpd="sng" algn="ctr">
-                      <a:solidFill>
-                        <a:srgbClr val="000000"/>
-                      </a:solidFill>
-                      <a:prstDash val="solid"/>
-                      <a:round/>
-                      <a:headEnd type="none" w="med" len="med"/>
-                      <a:tailEnd type="none" w="med" len="med"/>
-                    </a:lnR>
-                    <a:lnT w="12700" cap="flat" cmpd="sng" algn="ctr">
-                      <a:solidFill>
-                        <a:srgbClr val="000000"/>
-                      </a:solidFill>
-                      <a:prstDash val="solid"/>
-                      <a:round/>
-                      <a:headEnd type="none" w="med" len="med"/>
-                      <a:tailEnd type="none" w="med" len="med"/>
-                    </a:lnT>
-                    <a:lnB w="12700" cap="flat" cmpd="sng" algn="ctr">
-                      <a:solidFill>
-                        <a:srgbClr val="000000"/>
-                      </a:solidFill>
-                      <a:prstDash val="solid"/>
-                      <a:round/>
-                      <a:headEnd type="none" w="med" len="med"/>
-                      <a:tailEnd type="none" w="med" len="med"/>
-                    </a:lnB>
-                    <a:solidFill>
-                      <a:srgbClr val="FFFFCC"/>
-                    </a:solidFill>
-                  </a:tcPr>
-                </a:tc>
-                <a:tc>
-                  <a:txBody>
-                    <a:bodyPr/>
-                    <a:lstStyle/>
-                    <a:p>
-                      <a:pPr marL="0" marR="0" indent="0" algn="l" defTabSz="914400" rtl="0" eaLnBrk="1" fontAlgn="auto" latinLnBrk="0" hangingPunct="1">
-                        <a:lnSpc>
-                          <a:spcPct val="115000"/>
-                        </a:lnSpc>
-                        <a:spcBef>
-                          <a:spcPts val="0"/>
-                        </a:spcBef>
-                        <a:spcAft>
-                          <a:spcPts val="0"/>
-                        </a:spcAft>
-                        <a:buClrTx/>
-                        <a:buSzTx/>
-                        <a:buFontTx/>
-                        <a:buNone/>
-                        <a:tabLst/>
-                        <a:defRPr/>
-                      </a:pPr>
-                      <a:r>
-                        <a:rPr lang="en-US" sz="1100" dirty="0">
-                          <a:latin typeface="Calibri"/>
-                          <a:ea typeface="Calibri"/>
-                          <a:cs typeface="Times New Roman"/>
-                        </a:rPr>
-                        <a:t>Particulate fog and smoke (simple particulate</a:t>
-                      </a:r>
-                      <a:r>
-                        <a:rPr lang="en-US" sz="1100" baseline="0" dirty="0">
-                          <a:latin typeface="Calibri"/>
-                          <a:ea typeface="Calibri"/>
-                          <a:cs typeface="Times New Roman"/>
-                        </a:rPr>
-                        <a:t> and textured</a:t>
-                      </a:r>
-                      <a:r>
-                        <a:rPr lang="en-US" sz="1100" dirty="0">
-                          <a:latin typeface="Calibri"/>
-                          <a:ea typeface="Calibri"/>
-                          <a:cs typeface="Times New Roman"/>
-                        </a:rPr>
-                        <a:t>)</a:t>
-                      </a:r>
-                    </a:p>
-                  </a:txBody>
-                  <a:tcPr marL="68580" marR="68580" marT="0" marB="0">
-                    <a:lnL w="12700" cap="flat" cmpd="sng" algn="ctr">
-                      <a:solidFill>
-                        <a:srgbClr val="000000"/>
-                      </a:solidFill>
-                      <a:prstDash val="solid"/>
-                      <a:round/>
-                      <a:headEnd type="none" w="med" len="med"/>
-                      <a:tailEnd type="none" w="med" len="med"/>
-                    </a:lnL>
-                    <a:lnR w="12700" cap="flat" cmpd="sng" algn="ctr">
-                      <a:solidFill>
-                        <a:srgbClr val="000000"/>
-                      </a:solidFill>
-                      <a:prstDash val="solid"/>
-                      <a:round/>
-                      <a:headEnd type="none" w="med" len="med"/>
-                      <a:tailEnd type="none" w="med" len="med"/>
-                    </a:lnR>
-                    <a:lnT w="12700" cap="flat" cmpd="sng" algn="ctr">
-                      <a:solidFill>
-                        <a:srgbClr val="000000"/>
-                      </a:solidFill>
-                      <a:prstDash val="solid"/>
-                      <a:round/>
-                      <a:headEnd type="none" w="med" len="med"/>
-                      <a:tailEnd type="none" w="med" len="med"/>
-                    </a:lnT>
-                    <a:lnB w="12700" cap="flat" cmpd="sng" algn="ctr">
-                      <a:solidFill>
-                        <a:srgbClr val="000000"/>
-                      </a:solidFill>
-                      <a:prstDash val="solid"/>
-                      <a:round/>
-                      <a:headEnd type="none" w="med" len="med"/>
-                      <a:tailEnd type="none" w="med" len="med"/>
-                    </a:lnB>
-                    <a:solidFill>
-                      <a:srgbClr val="FFFFCC"/>
-                    </a:solidFill>
-                  </a:tcPr>
-                </a:tc>
-                <a:extLst>
-                  <a:ext uri="{0D108BD9-81ED-4DB2-BD59-A6C34878D82A}">
-                    <a16:rowId xmlns:a16="http://schemas.microsoft.com/office/drawing/2014/main" val="10000"/>
-                  </a:ext>
-                </a:extLst>
-              </a:tr>
-              <a:tr h="154497">
-                <a:tc>
-                  <a:txBody>
-                    <a:bodyPr/>
-                    <a:lstStyle/>
-                    <a:p>
-                      <a:pPr marL="0" marR="0" indent="0" algn="ctr" defTabSz="914400" rtl="0" eaLnBrk="1" fontAlgn="auto" latinLnBrk="0" hangingPunct="1">
-                        <a:lnSpc>
-                          <a:spcPct val="115000"/>
-                        </a:lnSpc>
-                        <a:spcBef>
-                          <a:spcPts val="0"/>
-                        </a:spcBef>
-                        <a:spcAft>
-                          <a:spcPts val="0"/>
-                        </a:spcAft>
-                        <a:buClrTx/>
-                        <a:buSzTx/>
-                        <a:buFontTx/>
-                        <a:buNone/>
-                        <a:tabLst/>
-                        <a:defRPr/>
-                      </a:pPr>
-                      <a:r>
-                        <a:rPr lang="en-CA" sz="1100" dirty="0">
-                          <a:latin typeface="Calibri"/>
-                          <a:ea typeface="Calibri"/>
-                          <a:cs typeface="Times New Roman"/>
-                        </a:rPr>
-                        <a:t>Week 2</a:t>
-                      </a:r>
-                    </a:p>
-                  </a:txBody>
-                  <a:tcPr marL="68580" marR="68580" marT="0" marB="0">
-                    <a:lnL w="12700" cap="flat" cmpd="sng" algn="ctr">
-                      <a:solidFill>
-                        <a:srgbClr val="000000"/>
-                      </a:solidFill>
-                      <a:prstDash val="solid"/>
-                      <a:round/>
-                      <a:headEnd type="none" w="med" len="med"/>
-                      <a:tailEnd type="none" w="med" len="med"/>
-                    </a:lnL>
-                    <a:lnR w="12700" cap="flat" cmpd="sng" algn="ctr">
-                      <a:solidFill>
-                        <a:srgbClr val="000000"/>
-                      </a:solidFill>
-                      <a:prstDash val="solid"/>
-                      <a:round/>
-                      <a:headEnd type="none" w="med" len="med"/>
-                      <a:tailEnd type="none" w="med" len="med"/>
-                    </a:lnR>
-                    <a:lnT w="12700" cap="flat" cmpd="sng" algn="ctr">
-                      <a:solidFill>
-                        <a:srgbClr val="000000"/>
-                      </a:solidFill>
-                      <a:prstDash val="solid"/>
-                      <a:round/>
-                      <a:headEnd type="none" w="med" len="med"/>
-                      <a:tailEnd type="none" w="med" len="med"/>
-                    </a:lnT>
-                    <a:lnB w="12700" cap="flat" cmpd="sng" algn="ctr">
-                      <a:solidFill>
-                        <a:srgbClr val="000000"/>
-                      </a:solidFill>
-                      <a:prstDash val="solid"/>
-                      <a:round/>
-                      <a:headEnd type="none" w="med" len="med"/>
-                      <a:tailEnd type="none" w="med" len="med"/>
-                    </a:lnB>
-                    <a:solidFill>
-                      <a:srgbClr val="FFFFCC"/>
-                    </a:solidFill>
-                  </a:tcPr>
-                </a:tc>
-                <a:tc>
-                  <a:txBody>
-                    <a:bodyPr/>
-                    <a:lstStyle/>
-                    <a:p>
-                      <a:pPr marL="0" marR="0" indent="0" algn="l" defTabSz="914400" rtl="0" eaLnBrk="1" fontAlgn="auto" latinLnBrk="0" hangingPunct="1">
-                        <a:lnSpc>
-                          <a:spcPct val="115000"/>
-                        </a:lnSpc>
-                        <a:spcBef>
-                          <a:spcPts val="0"/>
-                        </a:spcBef>
-                        <a:spcAft>
-                          <a:spcPts val="0"/>
-                        </a:spcAft>
-                        <a:buClrTx/>
-                        <a:buSzTx/>
-                        <a:buFontTx/>
-                        <a:buNone/>
-                        <a:tabLst/>
-                        <a:defRPr/>
-                      </a:pPr>
-                      <a:r>
-                        <a:rPr lang="en-CA" sz="1100" dirty="0">
-                          <a:latin typeface="Calibri"/>
-                          <a:ea typeface="Calibri"/>
-                          <a:cs typeface="Times New Roman"/>
-                        </a:rPr>
-                        <a:t>Render to off-screen texture</a:t>
-                      </a:r>
-                    </a:p>
-                  </a:txBody>
-                  <a:tcPr marL="68580" marR="68580" marT="0" marB="0">
-                    <a:lnL w="12700" cap="flat" cmpd="sng" algn="ctr">
-                      <a:solidFill>
-                        <a:srgbClr val="000000"/>
-                      </a:solidFill>
-                      <a:prstDash val="solid"/>
-                      <a:round/>
-                      <a:headEnd type="none" w="med" len="med"/>
-                      <a:tailEnd type="none" w="med" len="med"/>
-                    </a:lnL>
-                    <a:lnR w="12700" cap="flat" cmpd="sng" algn="ctr">
-                      <a:solidFill>
-                        <a:srgbClr val="000000"/>
-                      </a:solidFill>
-                      <a:prstDash val="solid"/>
-                      <a:round/>
-                      <a:headEnd type="none" w="med" len="med"/>
-                      <a:tailEnd type="none" w="med" len="med"/>
-                    </a:lnR>
-                    <a:lnT w="12700" cap="flat" cmpd="sng" algn="ctr">
-                      <a:solidFill>
-                        <a:srgbClr val="000000"/>
-                      </a:solidFill>
-                      <a:prstDash val="solid"/>
-                      <a:round/>
-                      <a:headEnd type="none" w="med" len="med"/>
-                      <a:tailEnd type="none" w="med" len="med"/>
-                    </a:lnT>
-                    <a:lnB w="12700" cap="flat" cmpd="sng" algn="ctr">
-                      <a:solidFill>
-                        <a:srgbClr val="000000"/>
-                      </a:solidFill>
-                      <a:prstDash val="solid"/>
-                      <a:round/>
-                      <a:headEnd type="none" w="med" len="med"/>
-                      <a:tailEnd type="none" w="med" len="med"/>
-                    </a:lnB>
-                    <a:solidFill>
-                      <a:srgbClr val="FFFFCC"/>
-                    </a:solidFill>
-                  </a:tcPr>
-                </a:tc>
-                <a:extLst>
-                  <a:ext uri="{0D108BD9-81ED-4DB2-BD59-A6C34878D82A}">
-                    <a16:rowId xmlns:a16="http://schemas.microsoft.com/office/drawing/2014/main" val="10012"/>
-                  </a:ext>
-                </a:extLst>
-              </a:tr>
-              <a:tr h="217234">
-                <a:tc>
-                  <a:txBody>
-                    <a:bodyPr/>
-                    <a:lstStyle/>
-                    <a:p>
-                      <a:pPr marL="0" marR="0" indent="0" algn="ctr" defTabSz="914400" rtl="0" eaLnBrk="1" fontAlgn="auto" latinLnBrk="0" hangingPunct="1">
-                        <a:lnSpc>
-                          <a:spcPct val="115000"/>
-                        </a:lnSpc>
-                        <a:spcBef>
-                          <a:spcPts val="0"/>
-                        </a:spcBef>
-                        <a:spcAft>
-                          <a:spcPts val="0"/>
-                        </a:spcAft>
-                        <a:buClrTx/>
-                        <a:buSzTx/>
-                        <a:buFontTx/>
-                        <a:buNone/>
-                        <a:tabLst/>
-                        <a:defRPr/>
-                      </a:pPr>
-                      <a:r>
-                        <a:rPr lang="en-CA" sz="1100" dirty="0">
-                          <a:latin typeface="Calibri"/>
-                          <a:ea typeface="Calibri"/>
-                          <a:cs typeface="Times New Roman"/>
-                        </a:rPr>
-                        <a:t>Week 3</a:t>
-                      </a:r>
-                    </a:p>
-                  </a:txBody>
-                  <a:tcPr marL="68580" marR="68580" marT="0" marB="0">
-                    <a:lnL w="12700" cap="flat" cmpd="sng" algn="ctr">
-                      <a:solidFill>
-                        <a:srgbClr val="000000"/>
-                      </a:solidFill>
-                      <a:prstDash val="solid"/>
-                      <a:round/>
-                      <a:headEnd type="none" w="med" len="med"/>
-                      <a:tailEnd type="none" w="med" len="med"/>
-                    </a:lnL>
-                    <a:lnR w="12700" cap="flat" cmpd="sng" algn="ctr">
-                      <a:solidFill>
-                        <a:srgbClr val="000000"/>
-                      </a:solidFill>
-                      <a:prstDash val="solid"/>
-                      <a:round/>
-                      <a:headEnd type="none" w="med" len="med"/>
-                      <a:tailEnd type="none" w="med" len="med"/>
-                    </a:lnR>
-                    <a:lnT w="12700" cap="flat" cmpd="sng" algn="ctr">
-                      <a:solidFill>
-                        <a:srgbClr val="000000"/>
-                      </a:solidFill>
-                      <a:prstDash val="solid"/>
-                      <a:round/>
-                      <a:headEnd type="none" w="med" len="med"/>
-                      <a:tailEnd type="none" w="med" len="med"/>
-                    </a:lnT>
-                    <a:lnB w="12700" cap="flat" cmpd="sng" algn="ctr">
-                      <a:solidFill>
-                        <a:srgbClr val="000000"/>
-                      </a:solidFill>
-                      <a:prstDash val="solid"/>
-                      <a:round/>
-                      <a:headEnd type="none" w="med" len="med"/>
-                      <a:tailEnd type="none" w="med" len="med"/>
-                    </a:lnB>
-                    <a:solidFill>
-                      <a:srgbClr val="FFFFCC"/>
-                    </a:solidFill>
-                  </a:tcPr>
-                </a:tc>
-                <a:tc>
-                  <a:txBody>
-                    <a:bodyPr/>
-                    <a:lstStyle/>
-                    <a:p>
-                      <a:pPr>
-                        <a:lnSpc>
-                          <a:spcPct val="115000"/>
-                        </a:lnSpc>
-                        <a:spcAft>
-                          <a:spcPts val="0"/>
-                        </a:spcAft>
-                      </a:pPr>
-                      <a:r>
-                        <a:rPr lang="en-US" sz="1100" dirty="0">
-                          <a:latin typeface="Calibri"/>
-                          <a:ea typeface="Calibri"/>
-                          <a:cs typeface="Times New Roman"/>
-                        </a:rPr>
-                        <a:t>“Deferred rendering”, part 1: Basic full-screen, 2 pass, rendering: Full and partial full screen rendering</a:t>
-                      </a:r>
-                    </a:p>
-                  </a:txBody>
-                  <a:tcPr marL="68580" marR="68580" marT="0" marB="0">
-                    <a:lnL w="12700" cap="flat" cmpd="sng" algn="ctr">
-                      <a:solidFill>
-                        <a:srgbClr val="000000"/>
-                      </a:solidFill>
-                      <a:prstDash val="solid"/>
-                      <a:round/>
-                      <a:headEnd type="none" w="med" len="med"/>
-                      <a:tailEnd type="none" w="med" len="med"/>
-                    </a:lnL>
-                    <a:lnR w="12700" cap="flat" cmpd="sng" algn="ctr">
-                      <a:solidFill>
-                        <a:srgbClr val="000000"/>
-                      </a:solidFill>
-                      <a:prstDash val="solid"/>
-                      <a:round/>
-                      <a:headEnd type="none" w="med" len="med"/>
-                      <a:tailEnd type="none" w="med" len="med"/>
-                    </a:lnR>
-                    <a:lnT w="12700" cap="flat" cmpd="sng" algn="ctr">
-                      <a:solidFill>
-                        <a:srgbClr val="000000"/>
-                      </a:solidFill>
-                      <a:prstDash val="solid"/>
-                      <a:round/>
-                      <a:headEnd type="none" w="med" len="med"/>
-                      <a:tailEnd type="none" w="med" len="med"/>
-                    </a:lnT>
-                    <a:lnB w="12700" cap="flat" cmpd="sng" algn="ctr">
-                      <a:solidFill>
-                        <a:srgbClr val="000000"/>
-                      </a:solidFill>
-                      <a:prstDash val="solid"/>
-                      <a:round/>
-                      <a:headEnd type="none" w="med" len="med"/>
-                      <a:tailEnd type="none" w="med" len="med"/>
-                    </a:lnB>
-                    <a:solidFill>
-                      <a:srgbClr val="FFFFCC"/>
-                    </a:solidFill>
-                  </a:tcPr>
-                </a:tc>
-                <a:extLst>
-                  <a:ext uri="{0D108BD9-81ED-4DB2-BD59-A6C34878D82A}">
-                    <a16:rowId xmlns:a16="http://schemas.microsoft.com/office/drawing/2014/main" val="10001"/>
-                  </a:ext>
-                </a:extLst>
-              </a:tr>
-              <a:tr h="203524">
-                <a:tc>
-                  <a:txBody>
-                    <a:bodyPr/>
-                    <a:lstStyle/>
-                    <a:p>
-                      <a:pPr marL="0" marR="0" indent="0" algn="ctr" defTabSz="914400" rtl="0" eaLnBrk="1" fontAlgn="auto" latinLnBrk="0" hangingPunct="1">
-                        <a:lnSpc>
-                          <a:spcPct val="115000"/>
-                        </a:lnSpc>
-                        <a:spcBef>
-                          <a:spcPts val="0"/>
-                        </a:spcBef>
-                        <a:spcAft>
-                          <a:spcPts val="0"/>
-                        </a:spcAft>
-                        <a:buClrTx/>
-                        <a:buSzTx/>
-                        <a:buFontTx/>
-                        <a:buNone/>
-                        <a:tabLst/>
-                        <a:defRPr/>
-                      </a:pPr>
-                      <a:r>
-                        <a:rPr lang="en-CA" sz="1100" dirty="0">
-                          <a:latin typeface="Calibri"/>
-                          <a:ea typeface="Calibri"/>
-                          <a:cs typeface="Times New Roman"/>
-                        </a:rPr>
-                        <a:t>Week 4</a:t>
-                      </a:r>
-                    </a:p>
-                  </a:txBody>
-                  <a:tcPr marL="68580" marR="68580" marT="0" marB="0">
-                    <a:lnL w="12700" cap="flat" cmpd="sng" algn="ctr">
-                      <a:solidFill>
-                        <a:srgbClr val="000000"/>
-                      </a:solidFill>
-                      <a:prstDash val="solid"/>
-                      <a:round/>
-                      <a:headEnd type="none" w="med" len="med"/>
-                      <a:tailEnd type="none" w="med" len="med"/>
-                    </a:lnL>
-                    <a:lnR w="12700" cap="flat" cmpd="sng" algn="ctr">
-                      <a:solidFill>
-                        <a:srgbClr val="000000"/>
-                      </a:solidFill>
-                      <a:prstDash val="solid"/>
-                      <a:round/>
-                      <a:headEnd type="none" w="med" len="med"/>
-                      <a:tailEnd type="none" w="med" len="med"/>
-                    </a:lnR>
-                    <a:lnT w="12700" cap="flat" cmpd="sng" algn="ctr">
-                      <a:solidFill>
-                        <a:srgbClr val="000000"/>
-                      </a:solidFill>
-                      <a:prstDash val="solid"/>
-                      <a:round/>
-                      <a:headEnd type="none" w="med" len="med"/>
-                      <a:tailEnd type="none" w="med" len="med"/>
-                    </a:lnT>
-                    <a:lnB w="12700" cap="flat" cmpd="sng" algn="ctr">
-                      <a:solidFill>
-                        <a:srgbClr val="000000"/>
-                      </a:solidFill>
-                      <a:prstDash val="solid"/>
-                      <a:round/>
-                      <a:headEnd type="none" w="med" len="med"/>
-                      <a:tailEnd type="none" w="med" len="med"/>
-                    </a:lnB>
-                    <a:solidFill>
-                      <a:srgbClr val="FFFFCC"/>
-                    </a:solidFill>
-                  </a:tcPr>
-                </a:tc>
-                <a:tc>
-                  <a:txBody>
-                    <a:bodyPr/>
-                    <a:lstStyle/>
-                    <a:p>
-                      <a:pPr>
-                        <a:lnSpc>
-                          <a:spcPct val="115000"/>
-                        </a:lnSpc>
-                        <a:spcAft>
-                          <a:spcPts val="0"/>
-                        </a:spcAft>
-                      </a:pPr>
-                      <a:r>
-                        <a:rPr lang="en-US" sz="1100" dirty="0">
-                          <a:latin typeface="Calibri"/>
-                          <a:ea typeface="Calibri"/>
-                          <a:cs typeface="Times New Roman"/>
-                        </a:rPr>
-                        <a:t>Basic full-screen effects: </a:t>
-                      </a:r>
-                      <a:r>
-                        <a:rPr lang="en-US" sz="1100" dirty="0" err="1">
-                          <a:latin typeface="Calibri"/>
-                          <a:ea typeface="Calibri"/>
-                          <a:cs typeface="Times New Roman"/>
-                        </a:rPr>
-                        <a:t>colour</a:t>
-                      </a:r>
-                      <a:r>
-                        <a:rPr lang="en-US" sz="1100" dirty="0">
-                          <a:latin typeface="Calibri"/>
-                          <a:ea typeface="Calibri"/>
-                          <a:cs typeface="Times New Roman"/>
-                        </a:rPr>
-                        <a:t> filtering, blur, basic depth of field, bloom, etc.</a:t>
-                      </a:r>
-                    </a:p>
-                  </a:txBody>
-                  <a:tcPr marL="68580" marR="68580" marT="0" marB="0">
-                    <a:lnL w="12700" cap="flat" cmpd="sng" algn="ctr">
-                      <a:solidFill>
-                        <a:srgbClr val="000000"/>
-                      </a:solidFill>
-                      <a:prstDash val="solid"/>
-                      <a:round/>
-                      <a:headEnd type="none" w="med" len="med"/>
-                      <a:tailEnd type="none" w="med" len="med"/>
-                    </a:lnL>
-                    <a:lnR w="12700" cap="flat" cmpd="sng" algn="ctr">
-                      <a:solidFill>
-                        <a:srgbClr val="000000"/>
-                      </a:solidFill>
-                      <a:prstDash val="solid"/>
-                      <a:round/>
-                      <a:headEnd type="none" w="med" len="med"/>
-                      <a:tailEnd type="none" w="med" len="med"/>
-                    </a:lnR>
-                    <a:lnT w="12700" cap="flat" cmpd="sng" algn="ctr">
-                      <a:solidFill>
-                        <a:srgbClr val="000000"/>
-                      </a:solidFill>
-                      <a:prstDash val="solid"/>
-                      <a:round/>
-                      <a:headEnd type="none" w="med" len="med"/>
-                      <a:tailEnd type="none" w="med" len="med"/>
-                    </a:lnT>
-                    <a:lnB w="12700" cap="flat" cmpd="sng" algn="ctr">
-                      <a:solidFill>
-                        <a:srgbClr val="000000"/>
-                      </a:solidFill>
-                      <a:prstDash val="solid"/>
-                      <a:round/>
-                      <a:headEnd type="none" w="med" len="med"/>
-                      <a:tailEnd type="none" w="med" len="med"/>
-                    </a:lnB>
-                    <a:solidFill>
-                      <a:srgbClr val="FFFFCC"/>
-                    </a:solidFill>
-                  </a:tcPr>
-                </a:tc>
-                <a:extLst>
-                  <a:ext uri="{0D108BD9-81ED-4DB2-BD59-A6C34878D82A}">
-                    <a16:rowId xmlns:a16="http://schemas.microsoft.com/office/drawing/2014/main" val="10002"/>
-                  </a:ext>
-                </a:extLst>
-              </a:tr>
-              <a:tr h="217724">
-                <a:tc>
-                  <a:txBody>
-                    <a:bodyPr/>
-                    <a:lstStyle/>
-                    <a:p>
-                      <a:pPr marL="0" marR="0" indent="0" algn="ctr" defTabSz="914400" rtl="0" eaLnBrk="1" fontAlgn="auto" latinLnBrk="0" hangingPunct="1">
-                        <a:lnSpc>
-                          <a:spcPct val="115000"/>
-                        </a:lnSpc>
-                        <a:spcBef>
-                          <a:spcPts val="0"/>
-                        </a:spcBef>
-                        <a:spcAft>
-                          <a:spcPts val="0"/>
-                        </a:spcAft>
-                        <a:buClrTx/>
-                        <a:buSzTx/>
-                        <a:buFontTx/>
-                        <a:buNone/>
-                        <a:tabLst/>
-                        <a:defRPr/>
-                      </a:pPr>
-                      <a:r>
-                        <a:rPr lang="en-CA" sz="1100" dirty="0">
-                          <a:latin typeface="Calibri"/>
-                          <a:ea typeface="Calibri"/>
-                          <a:cs typeface="Times New Roman"/>
-                        </a:rPr>
-                        <a:t>Week 5</a:t>
-                      </a:r>
-                    </a:p>
-                  </a:txBody>
-                  <a:tcPr marL="68580" marR="68580" marT="0" marB="0">
-                    <a:lnL w="12700" cap="flat" cmpd="sng" algn="ctr">
-                      <a:solidFill>
-                        <a:srgbClr val="000000"/>
-                      </a:solidFill>
-                      <a:prstDash val="solid"/>
-                      <a:round/>
-                      <a:headEnd type="none" w="med" len="med"/>
-                      <a:tailEnd type="none" w="med" len="med"/>
-                    </a:lnL>
-                    <a:lnR w="12700" cap="flat" cmpd="sng" algn="ctr">
-                      <a:solidFill>
-                        <a:srgbClr val="000000"/>
-                      </a:solidFill>
-                      <a:prstDash val="solid"/>
-                      <a:round/>
-                      <a:headEnd type="none" w="med" len="med"/>
-                      <a:tailEnd type="none" w="med" len="med"/>
-                    </a:lnR>
-                    <a:lnT w="12700" cap="flat" cmpd="sng" algn="ctr">
-                      <a:solidFill>
-                        <a:srgbClr val="000000"/>
-                      </a:solidFill>
-                      <a:prstDash val="solid"/>
-                      <a:round/>
-                      <a:headEnd type="none" w="med" len="med"/>
-                      <a:tailEnd type="none" w="med" len="med"/>
-                    </a:lnT>
-                    <a:lnB w="12700" cap="flat" cmpd="sng" algn="ctr">
-                      <a:solidFill>
-                        <a:srgbClr val="000000"/>
-                      </a:solidFill>
-                      <a:prstDash val="solid"/>
-                      <a:round/>
-                      <a:headEnd type="none" w="med" len="med"/>
-                      <a:tailEnd type="none" w="med" len="med"/>
-                    </a:lnB>
-                    <a:solidFill>
-                      <a:srgbClr val="FFFFCC"/>
-                    </a:solidFill>
-                  </a:tcPr>
-                </a:tc>
-                <a:tc>
-                  <a:txBody>
-                    <a:bodyPr/>
-                    <a:lstStyle/>
-                    <a:p>
-                      <a:pPr marL="0" marR="0" indent="0" algn="l" defTabSz="914400" rtl="0" eaLnBrk="1" fontAlgn="auto" latinLnBrk="0" hangingPunct="1">
-                        <a:lnSpc>
-                          <a:spcPct val="115000"/>
-                        </a:lnSpc>
-                        <a:spcBef>
-                          <a:spcPts val="0"/>
-                        </a:spcBef>
-                        <a:spcAft>
-                          <a:spcPts val="0"/>
-                        </a:spcAft>
-                        <a:buClrTx/>
-                        <a:buSzTx/>
-                        <a:buFontTx/>
-                        <a:buNone/>
-                        <a:tabLst/>
-                        <a:defRPr/>
-                      </a:pPr>
-                      <a:r>
-                        <a:rPr lang="en-US" sz="1100" dirty="0">
-                          <a:latin typeface="Calibri"/>
-                          <a:ea typeface="Calibri"/>
-                          <a:cs typeface="Times New Roman"/>
-                        </a:rPr>
-                        <a:t>Geometry </a:t>
-                      </a:r>
-                      <a:r>
-                        <a:rPr lang="en-US" sz="1100" dirty="0" err="1">
-                          <a:latin typeface="Calibri"/>
-                          <a:ea typeface="Calibri"/>
-                          <a:cs typeface="Times New Roman"/>
-                        </a:rPr>
-                        <a:t>shader</a:t>
-                      </a:r>
-                      <a:r>
-                        <a:rPr lang="en-US" sz="1100" dirty="0">
-                          <a:latin typeface="Calibri"/>
-                          <a:ea typeface="Calibri"/>
-                          <a:cs typeface="Times New Roman"/>
-                        </a:rPr>
-                        <a:t> introduction</a:t>
-                      </a:r>
-                    </a:p>
-                  </a:txBody>
-                  <a:tcPr marL="68580" marR="68580" marT="0" marB="0">
-                    <a:lnL w="12700" cap="flat" cmpd="sng" algn="ctr">
-                      <a:solidFill>
-                        <a:srgbClr val="000000"/>
-                      </a:solidFill>
-                      <a:prstDash val="solid"/>
-                      <a:round/>
-                      <a:headEnd type="none" w="med" len="med"/>
-                      <a:tailEnd type="none" w="med" len="med"/>
-                    </a:lnL>
-                    <a:lnR w="12700" cap="flat" cmpd="sng" algn="ctr">
-                      <a:solidFill>
-                        <a:srgbClr val="000000"/>
-                      </a:solidFill>
-                      <a:prstDash val="solid"/>
-                      <a:round/>
-                      <a:headEnd type="none" w="med" len="med"/>
-                      <a:tailEnd type="none" w="med" len="med"/>
-                    </a:lnR>
-                    <a:lnT w="12700" cap="flat" cmpd="sng" algn="ctr">
-                      <a:solidFill>
-                        <a:srgbClr val="000000"/>
-                      </a:solidFill>
-                      <a:prstDash val="solid"/>
-                      <a:round/>
-                      <a:headEnd type="none" w="med" len="med"/>
-                      <a:tailEnd type="none" w="med" len="med"/>
-                    </a:lnT>
-                    <a:lnB w="12700" cap="flat" cmpd="sng" algn="ctr">
-                      <a:solidFill>
-                        <a:srgbClr val="000000"/>
-                      </a:solidFill>
-                      <a:prstDash val="solid"/>
-                      <a:round/>
-                      <a:headEnd type="none" w="med" len="med"/>
-                      <a:tailEnd type="none" w="med" len="med"/>
-                    </a:lnB>
-                    <a:solidFill>
-                      <a:srgbClr val="FFFFCC"/>
-                    </a:solidFill>
-                  </a:tcPr>
-                </a:tc>
-                <a:extLst>
-                  <a:ext uri="{0D108BD9-81ED-4DB2-BD59-A6C34878D82A}">
-                    <a16:rowId xmlns:a16="http://schemas.microsoft.com/office/drawing/2014/main" val="10003"/>
-                  </a:ext>
-                </a:extLst>
-              </a:tr>
-              <a:tr h="217724">
-                <a:tc>
-                  <a:txBody>
-                    <a:bodyPr/>
-                    <a:lstStyle/>
-                    <a:p>
-                      <a:pPr marL="0" marR="0" indent="0" algn="ctr" defTabSz="914400" rtl="0" eaLnBrk="1" fontAlgn="auto" latinLnBrk="0" hangingPunct="1">
-                        <a:lnSpc>
-                          <a:spcPct val="115000"/>
-                        </a:lnSpc>
-                        <a:spcBef>
-                          <a:spcPts val="0"/>
-                        </a:spcBef>
-                        <a:spcAft>
-                          <a:spcPts val="0"/>
-                        </a:spcAft>
-                        <a:buClrTx/>
-                        <a:buSzTx/>
-                        <a:buFontTx/>
-                        <a:buNone/>
-                        <a:tabLst/>
-                        <a:defRPr/>
-                      </a:pPr>
-                      <a:r>
-                        <a:rPr lang="en-CA" sz="1100" dirty="0">
-                          <a:latin typeface="Calibri"/>
-                          <a:ea typeface="Calibri"/>
-                          <a:cs typeface="Times New Roman"/>
-                        </a:rPr>
-                        <a:t>Week 6</a:t>
-                      </a:r>
-                    </a:p>
-                  </a:txBody>
-                  <a:tcPr marL="68580" marR="68580" marT="0" marB="0">
-                    <a:lnL w="12700" cap="flat" cmpd="sng" algn="ctr">
-                      <a:solidFill>
-                        <a:srgbClr val="000000"/>
-                      </a:solidFill>
-                      <a:prstDash val="solid"/>
-                      <a:round/>
-                      <a:headEnd type="none" w="med" len="med"/>
-                      <a:tailEnd type="none" w="med" len="med"/>
-                    </a:lnL>
-                    <a:lnR w="12700" cap="flat" cmpd="sng" algn="ctr">
-                      <a:solidFill>
-                        <a:srgbClr val="000000"/>
-                      </a:solidFill>
-                      <a:prstDash val="solid"/>
-                      <a:round/>
-                      <a:headEnd type="none" w="med" len="med"/>
-                      <a:tailEnd type="none" w="med" len="med"/>
-                    </a:lnR>
-                    <a:lnT w="12700" cap="flat" cmpd="sng" algn="ctr">
-                      <a:solidFill>
-                        <a:srgbClr val="000000"/>
-                      </a:solidFill>
-                      <a:prstDash val="solid"/>
-                      <a:round/>
-                      <a:headEnd type="none" w="med" len="med"/>
-                      <a:tailEnd type="none" w="med" len="med"/>
-                    </a:lnT>
-                    <a:lnB w="12700" cap="flat" cmpd="sng" algn="ctr">
-                      <a:solidFill>
-                        <a:srgbClr val="000000"/>
-                      </a:solidFill>
-                      <a:prstDash val="solid"/>
-                      <a:round/>
-                      <a:headEnd type="none" w="med" len="med"/>
-                      <a:tailEnd type="none" w="med" len="med"/>
-                    </a:lnB>
-                    <a:solidFill>
-                      <a:srgbClr val="FFFFCC"/>
-                    </a:solidFill>
-                  </a:tcPr>
-                </a:tc>
-                <a:tc>
-                  <a:txBody>
-                    <a:bodyPr/>
-                    <a:lstStyle/>
-                    <a:p>
-                      <a:pPr marL="0" marR="0" indent="0" algn="l" defTabSz="914400" rtl="0" eaLnBrk="1" fontAlgn="auto" latinLnBrk="0" hangingPunct="1">
-                        <a:lnSpc>
-                          <a:spcPct val="115000"/>
-                        </a:lnSpc>
-                        <a:spcBef>
-                          <a:spcPts val="0"/>
-                        </a:spcBef>
-                        <a:spcAft>
-                          <a:spcPts val="0"/>
-                        </a:spcAft>
-                        <a:buClrTx/>
-                        <a:buSzTx/>
-                        <a:buFontTx/>
-                        <a:buNone/>
-                        <a:tabLst/>
-                        <a:defRPr/>
-                      </a:pPr>
-                      <a:r>
-                        <a:rPr lang="en-US" sz="1100" dirty="0">
-                          <a:latin typeface="Calibri"/>
-                          <a:ea typeface="Calibri"/>
-                          <a:cs typeface="Times New Roman"/>
-                        </a:rPr>
-                        <a:t>Decals: texture based: splat, bullet holes. Vertex based: grass, fur, and hair</a:t>
-                      </a:r>
-                    </a:p>
-                  </a:txBody>
-                  <a:tcPr marL="68580" marR="68580" marT="0" marB="0">
-                    <a:lnL w="12700" cap="flat" cmpd="sng" algn="ctr">
-                      <a:solidFill>
-                        <a:srgbClr val="000000"/>
-                      </a:solidFill>
-                      <a:prstDash val="solid"/>
-                      <a:round/>
-                      <a:headEnd type="none" w="med" len="med"/>
-                      <a:tailEnd type="none" w="med" len="med"/>
-                    </a:lnL>
-                    <a:lnR w="12700" cap="flat" cmpd="sng" algn="ctr">
-                      <a:solidFill>
-                        <a:srgbClr val="000000"/>
-                      </a:solidFill>
-                      <a:prstDash val="solid"/>
-                      <a:round/>
-                      <a:headEnd type="none" w="med" len="med"/>
-                      <a:tailEnd type="none" w="med" len="med"/>
-                    </a:lnR>
-                    <a:lnT w="12700" cap="flat" cmpd="sng" algn="ctr">
-                      <a:solidFill>
-                        <a:srgbClr val="000000"/>
-                      </a:solidFill>
-                      <a:prstDash val="solid"/>
-                      <a:round/>
-                      <a:headEnd type="none" w="med" len="med"/>
-                      <a:tailEnd type="none" w="med" len="med"/>
-                    </a:lnT>
-                    <a:lnB w="12700" cap="flat" cmpd="sng" algn="ctr">
-                      <a:solidFill>
-                        <a:srgbClr val="000000"/>
-                      </a:solidFill>
-                      <a:prstDash val="solid"/>
-                      <a:round/>
-                      <a:headEnd type="none" w="med" len="med"/>
-                      <a:tailEnd type="none" w="med" len="med"/>
-                    </a:lnB>
-                    <a:solidFill>
-                      <a:srgbClr val="FFFFCC"/>
-                    </a:solidFill>
-                  </a:tcPr>
-                </a:tc>
-                <a:extLst>
-                  <a:ext uri="{0D108BD9-81ED-4DB2-BD59-A6C34878D82A}">
-                    <a16:rowId xmlns:a16="http://schemas.microsoft.com/office/drawing/2014/main" val="10004"/>
-                  </a:ext>
-                </a:extLst>
-              </a:tr>
-              <a:tr h="196773">
-                <a:tc>
-                  <a:txBody>
-                    <a:bodyPr/>
-                    <a:lstStyle/>
-                    <a:p>
-                      <a:pPr marL="0" marR="0" indent="0" algn="ctr" defTabSz="914400" rtl="0" eaLnBrk="1" fontAlgn="auto" latinLnBrk="0" hangingPunct="1">
-                        <a:lnSpc>
-                          <a:spcPct val="115000"/>
-                        </a:lnSpc>
-                        <a:spcBef>
-                          <a:spcPts val="0"/>
-                        </a:spcBef>
-                        <a:spcAft>
-                          <a:spcPts val="0"/>
-                        </a:spcAft>
-                        <a:buClrTx/>
-                        <a:buSzTx/>
-                        <a:buFontTx/>
-                        <a:buNone/>
-                        <a:tabLst/>
-                        <a:defRPr/>
-                      </a:pPr>
-                      <a:r>
-                        <a:rPr lang="en-CA" sz="1100" dirty="0">
-                          <a:latin typeface="Calibri"/>
-                          <a:ea typeface="Calibri"/>
-                          <a:cs typeface="Times New Roman"/>
-                        </a:rPr>
-                        <a:t>Week 7</a:t>
-                      </a:r>
-                    </a:p>
-                  </a:txBody>
-                  <a:tcPr marL="68580" marR="68580" marT="0" marB="0">
-                    <a:lnL w="12700" cap="flat" cmpd="sng" algn="ctr">
-                      <a:solidFill>
-                        <a:srgbClr val="000000"/>
-                      </a:solidFill>
-                      <a:prstDash val="solid"/>
-                      <a:round/>
-                      <a:headEnd type="none" w="med" len="med"/>
-                      <a:tailEnd type="none" w="med" len="med"/>
-                    </a:lnL>
-                    <a:lnR w="12700" cap="flat" cmpd="sng" algn="ctr">
-                      <a:solidFill>
-                        <a:srgbClr val="000000"/>
-                      </a:solidFill>
-                      <a:prstDash val="solid"/>
-                      <a:round/>
-                      <a:headEnd type="none" w="med" len="med"/>
-                      <a:tailEnd type="none" w="med" len="med"/>
-                    </a:lnR>
-                    <a:lnT w="12700" cap="flat" cmpd="sng" algn="ctr">
-                      <a:solidFill>
-                        <a:srgbClr val="000000"/>
-                      </a:solidFill>
-                      <a:prstDash val="solid"/>
-                      <a:round/>
-                      <a:headEnd type="none" w="med" len="med"/>
-                      <a:tailEnd type="none" w="med" len="med"/>
-                    </a:lnT>
-                    <a:lnB w="12700" cap="flat" cmpd="sng" algn="ctr">
-                      <a:solidFill>
-                        <a:srgbClr val="000000"/>
-                      </a:solidFill>
-                      <a:prstDash val="solid"/>
-                      <a:round/>
-                      <a:headEnd type="none" w="med" len="med"/>
-                      <a:tailEnd type="none" w="med" len="med"/>
-                    </a:lnB>
-                    <a:solidFill>
-                      <a:srgbClr val="FFFFCC"/>
-                    </a:solidFill>
-                  </a:tcPr>
-                </a:tc>
-                <a:tc>
-                  <a:txBody>
-                    <a:bodyPr/>
-                    <a:lstStyle/>
-                    <a:p>
-                      <a:pPr marL="0" marR="0" indent="0" algn="l" defTabSz="914400" rtl="0" eaLnBrk="1" fontAlgn="auto" latinLnBrk="0" hangingPunct="1">
-                        <a:lnSpc>
-                          <a:spcPct val="115000"/>
-                        </a:lnSpc>
-                        <a:spcBef>
-                          <a:spcPts val="0"/>
-                        </a:spcBef>
-                        <a:spcAft>
-                          <a:spcPts val="0"/>
-                        </a:spcAft>
-                        <a:buClrTx/>
-                        <a:buSzTx/>
-                        <a:buFontTx/>
-                        <a:buNone/>
-                        <a:tabLst/>
-                        <a:defRPr/>
-                      </a:pPr>
-                      <a:r>
-                        <a:rPr lang="en-CA" sz="1100" baseline="0" dirty="0">
-                          <a:latin typeface="Calibri"/>
-                          <a:ea typeface="Calibri"/>
-                          <a:cs typeface="Times New Roman"/>
-                        </a:rPr>
-                        <a:t>Mid-term, Project #1</a:t>
-                      </a:r>
-                      <a:endParaRPr lang="en-CA" sz="1100" dirty="0">
-                        <a:latin typeface="Calibri"/>
-                        <a:ea typeface="Calibri"/>
-                        <a:cs typeface="Times New Roman"/>
-                      </a:endParaRPr>
-                    </a:p>
-                  </a:txBody>
-                  <a:tcPr marL="68580" marR="68580" marT="0" marB="0">
-                    <a:lnL w="12700" cap="flat" cmpd="sng" algn="ctr">
-                      <a:solidFill>
-                        <a:srgbClr val="000000"/>
-                      </a:solidFill>
-                      <a:prstDash val="solid"/>
-                      <a:round/>
-                      <a:headEnd type="none" w="med" len="med"/>
-                      <a:tailEnd type="none" w="med" len="med"/>
-                    </a:lnL>
-                    <a:lnR w="12700" cap="flat" cmpd="sng" algn="ctr">
-                      <a:solidFill>
-                        <a:srgbClr val="000000"/>
-                      </a:solidFill>
-                      <a:prstDash val="solid"/>
-                      <a:round/>
-                      <a:headEnd type="none" w="med" len="med"/>
-                      <a:tailEnd type="none" w="med" len="med"/>
-                    </a:lnR>
-                    <a:lnT w="12700" cap="flat" cmpd="sng" algn="ctr">
-                      <a:solidFill>
-                        <a:srgbClr val="000000"/>
-                      </a:solidFill>
-                      <a:prstDash val="solid"/>
-                      <a:round/>
-                      <a:headEnd type="none" w="med" len="med"/>
-                      <a:tailEnd type="none" w="med" len="med"/>
-                    </a:lnT>
-                    <a:lnB w="12700" cap="flat" cmpd="sng" algn="ctr">
-                      <a:solidFill>
-                        <a:srgbClr val="000000"/>
-                      </a:solidFill>
-                      <a:prstDash val="solid"/>
-                      <a:round/>
-                      <a:headEnd type="none" w="med" len="med"/>
-                      <a:tailEnd type="none" w="med" len="med"/>
-                    </a:lnB>
-                    <a:solidFill>
-                      <a:srgbClr val="FFFFCC"/>
-                    </a:solidFill>
-                  </a:tcPr>
-                </a:tc>
-                <a:extLst>
-                  <a:ext uri="{0D108BD9-81ED-4DB2-BD59-A6C34878D82A}">
-                    <a16:rowId xmlns:a16="http://schemas.microsoft.com/office/drawing/2014/main" val="10005"/>
-                  </a:ext>
-                </a:extLst>
-              </a:tr>
-              <a:tr h="153117">
-                <a:tc>
-                  <a:txBody>
-                    <a:bodyPr/>
-                    <a:lstStyle/>
-                    <a:p>
-                      <a:pPr marL="0" marR="0" indent="0" algn="ctr" defTabSz="914400" rtl="0" eaLnBrk="1" fontAlgn="auto" latinLnBrk="0" hangingPunct="1">
-                        <a:lnSpc>
-                          <a:spcPct val="115000"/>
-                        </a:lnSpc>
-                        <a:spcBef>
-                          <a:spcPts val="0"/>
-                        </a:spcBef>
-                        <a:spcAft>
-                          <a:spcPts val="0"/>
-                        </a:spcAft>
-                        <a:buClrTx/>
-                        <a:buSzTx/>
-                        <a:buFontTx/>
-                        <a:buNone/>
-                        <a:tabLst/>
-                        <a:defRPr/>
-                      </a:pPr>
-                      <a:r>
-                        <a:rPr lang="en-CA" sz="1100" dirty="0">
-                          <a:latin typeface="Calibri"/>
-                          <a:ea typeface="Calibri"/>
-                          <a:cs typeface="Times New Roman"/>
-                        </a:rPr>
-                        <a:t>Week 8</a:t>
-                      </a:r>
-                    </a:p>
-                  </a:txBody>
-                  <a:tcPr marL="68580" marR="68580" marT="0" marB="0">
-                    <a:lnL w="12700" cap="flat" cmpd="sng" algn="ctr">
-                      <a:solidFill>
-                        <a:srgbClr val="000000"/>
-                      </a:solidFill>
-                      <a:prstDash val="solid"/>
-                      <a:round/>
-                      <a:headEnd type="none" w="med" len="med"/>
-                      <a:tailEnd type="none" w="med" len="med"/>
-                    </a:lnL>
-                    <a:lnR w="12700" cap="flat" cmpd="sng" algn="ctr">
-                      <a:solidFill>
-                        <a:srgbClr val="000000"/>
-                      </a:solidFill>
-                      <a:prstDash val="solid"/>
-                      <a:round/>
-                      <a:headEnd type="none" w="med" len="med"/>
-                      <a:tailEnd type="none" w="med" len="med"/>
-                    </a:lnR>
-                    <a:lnT w="12700" cap="flat" cmpd="sng" algn="ctr">
-                      <a:solidFill>
-                        <a:srgbClr val="000000"/>
-                      </a:solidFill>
-                      <a:prstDash val="solid"/>
-                      <a:round/>
-                      <a:headEnd type="none" w="med" len="med"/>
-                      <a:tailEnd type="none" w="med" len="med"/>
-                    </a:lnT>
-                    <a:lnB w="12700" cap="flat" cmpd="sng" algn="ctr">
-                      <a:solidFill>
-                        <a:srgbClr val="000000"/>
-                      </a:solidFill>
-                      <a:prstDash val="solid"/>
-                      <a:round/>
-                      <a:headEnd type="none" w="med" len="med"/>
-                      <a:tailEnd type="none" w="med" len="med"/>
-                    </a:lnB>
-                    <a:solidFill>
-                      <a:srgbClr val="FFFFCC"/>
-                    </a:solidFill>
-                  </a:tcPr>
-                </a:tc>
-                <a:tc>
-                  <a:txBody>
-                    <a:bodyPr/>
-                    <a:lstStyle/>
-                    <a:p>
-                      <a:pPr marL="0" marR="0" indent="0" algn="l" defTabSz="914400" rtl="0" eaLnBrk="1" fontAlgn="auto" latinLnBrk="0" hangingPunct="1">
-                        <a:lnSpc>
-                          <a:spcPct val="115000"/>
-                        </a:lnSpc>
-                        <a:spcBef>
-                          <a:spcPts val="0"/>
-                        </a:spcBef>
-                        <a:spcAft>
-                          <a:spcPts val="0"/>
-                        </a:spcAft>
-                        <a:buClrTx/>
-                        <a:buSzTx/>
-                        <a:buFontTx/>
-                        <a:buNone/>
-                        <a:tabLst/>
-                        <a:defRPr/>
-                      </a:pPr>
-                      <a:r>
-                        <a:rPr lang="en-CA" sz="1100" dirty="0">
-                          <a:latin typeface="Calibri"/>
-                          <a:ea typeface="Calibri"/>
-                          <a:cs typeface="Times New Roman"/>
-                        </a:rPr>
-                        <a:t>Stencil and scissor buffers</a:t>
-                      </a:r>
-                    </a:p>
-                  </a:txBody>
-                  <a:tcPr marL="68580" marR="68580" marT="0" marB="0">
-                    <a:lnL w="12700" cap="flat" cmpd="sng" algn="ctr">
-                      <a:solidFill>
-                        <a:srgbClr val="000000"/>
-                      </a:solidFill>
-                      <a:prstDash val="solid"/>
-                      <a:round/>
-                      <a:headEnd type="none" w="med" len="med"/>
-                      <a:tailEnd type="none" w="med" len="med"/>
-                    </a:lnL>
-                    <a:lnR w="12700" cap="flat" cmpd="sng" algn="ctr">
-                      <a:solidFill>
-                        <a:srgbClr val="000000"/>
-                      </a:solidFill>
-                      <a:prstDash val="solid"/>
-                      <a:round/>
-                      <a:headEnd type="none" w="med" len="med"/>
-                      <a:tailEnd type="none" w="med" len="med"/>
-                    </a:lnR>
-                    <a:lnT w="12700" cap="flat" cmpd="sng" algn="ctr">
-                      <a:solidFill>
-                        <a:srgbClr val="000000"/>
-                      </a:solidFill>
-                      <a:prstDash val="solid"/>
-                      <a:round/>
-                      <a:headEnd type="none" w="med" len="med"/>
-                      <a:tailEnd type="none" w="med" len="med"/>
-                    </a:lnT>
-                    <a:lnB w="12700" cap="flat" cmpd="sng" algn="ctr">
-                      <a:solidFill>
-                        <a:srgbClr val="000000"/>
-                      </a:solidFill>
-                      <a:prstDash val="solid"/>
-                      <a:round/>
-                      <a:headEnd type="none" w="med" len="med"/>
-                      <a:tailEnd type="none" w="med" len="med"/>
-                    </a:lnB>
-                    <a:solidFill>
-                      <a:srgbClr val="FFFFCC"/>
-                    </a:solidFill>
-                  </a:tcPr>
-                </a:tc>
-                <a:extLst>
-                  <a:ext uri="{0D108BD9-81ED-4DB2-BD59-A6C34878D82A}">
-                    <a16:rowId xmlns:a16="http://schemas.microsoft.com/office/drawing/2014/main" val="10013"/>
-                  </a:ext>
-                </a:extLst>
-              </a:tr>
-              <a:tr h="145950">
-                <a:tc>
-                  <a:txBody>
-                    <a:bodyPr/>
-                    <a:lstStyle/>
-                    <a:p>
-                      <a:pPr marL="0" marR="0" indent="0" algn="ctr" defTabSz="914400" rtl="0" eaLnBrk="1" fontAlgn="auto" latinLnBrk="0" hangingPunct="1">
-                        <a:lnSpc>
-                          <a:spcPct val="115000"/>
-                        </a:lnSpc>
-                        <a:spcBef>
-                          <a:spcPts val="0"/>
-                        </a:spcBef>
-                        <a:spcAft>
-                          <a:spcPts val="0"/>
-                        </a:spcAft>
-                        <a:buClrTx/>
-                        <a:buSzTx/>
-                        <a:buFontTx/>
-                        <a:buNone/>
-                        <a:tabLst/>
-                        <a:defRPr/>
-                      </a:pPr>
-                      <a:r>
-                        <a:rPr lang="en-CA" sz="1100" dirty="0">
-                          <a:latin typeface="Calibri"/>
-                          <a:ea typeface="Calibri"/>
-                          <a:cs typeface="Times New Roman"/>
-                        </a:rPr>
-                        <a:t>Week 9</a:t>
-                      </a:r>
-                    </a:p>
-                  </a:txBody>
-                  <a:tcPr marL="68580" marR="68580" marT="0" marB="0">
-                    <a:lnL w="12700" cap="flat" cmpd="sng" algn="ctr">
-                      <a:solidFill>
-                        <a:srgbClr val="000000"/>
-                      </a:solidFill>
-                      <a:prstDash val="solid"/>
-                      <a:round/>
-                      <a:headEnd type="none" w="med" len="med"/>
-                      <a:tailEnd type="none" w="med" len="med"/>
-                    </a:lnL>
-                    <a:lnR w="12700" cap="flat" cmpd="sng" algn="ctr">
-                      <a:solidFill>
-                        <a:srgbClr val="000000"/>
-                      </a:solidFill>
-                      <a:prstDash val="solid"/>
-                      <a:round/>
-                      <a:headEnd type="none" w="med" len="med"/>
-                      <a:tailEnd type="none" w="med" len="med"/>
-                    </a:lnR>
-                    <a:lnT w="12700" cap="flat" cmpd="sng" algn="ctr">
-                      <a:solidFill>
-                        <a:srgbClr val="000000"/>
-                      </a:solidFill>
-                      <a:prstDash val="solid"/>
-                      <a:round/>
-                      <a:headEnd type="none" w="med" len="med"/>
-                      <a:tailEnd type="none" w="med" len="med"/>
-                    </a:lnT>
-                    <a:lnB w="12700" cap="flat" cmpd="sng" algn="ctr">
-                      <a:solidFill>
-                        <a:srgbClr val="000000"/>
-                      </a:solidFill>
-                      <a:prstDash val="solid"/>
-                      <a:round/>
-                      <a:headEnd type="none" w="med" len="med"/>
-                      <a:tailEnd type="none" w="med" len="med"/>
-                    </a:lnB>
-                    <a:solidFill>
-                      <a:srgbClr val="FFFFCC"/>
-                    </a:solidFill>
-                  </a:tcPr>
-                </a:tc>
-                <a:tc>
-                  <a:txBody>
-                    <a:bodyPr/>
-                    <a:lstStyle/>
-                    <a:p>
-                      <a:pPr marL="0" marR="0" indent="0" algn="l" defTabSz="914400" rtl="0" eaLnBrk="1" fontAlgn="auto" latinLnBrk="0" hangingPunct="1">
-                        <a:lnSpc>
-                          <a:spcPct val="115000"/>
-                        </a:lnSpc>
-                        <a:spcBef>
-                          <a:spcPts val="0"/>
-                        </a:spcBef>
-                        <a:spcAft>
-                          <a:spcPts val="0"/>
-                        </a:spcAft>
-                        <a:buClrTx/>
-                        <a:buSzTx/>
-                        <a:buFontTx/>
-                        <a:buNone/>
-                        <a:tabLst/>
-                        <a:defRPr/>
-                      </a:pPr>
-                      <a:r>
-                        <a:rPr lang="en-US" sz="1100" dirty="0">
-                          <a:latin typeface="Calibri"/>
-                          <a:ea typeface="Calibri"/>
-                          <a:cs typeface="Times New Roman"/>
-                        </a:rPr>
-                        <a:t>Tessellation shader: basics, LOD, and curve based tessellation (LOD also in Gems)</a:t>
-                      </a:r>
-                    </a:p>
-                    <a:p>
-                      <a:pPr marL="0" marR="0" indent="0" algn="l" defTabSz="914400" rtl="0" eaLnBrk="1" fontAlgn="auto" latinLnBrk="0" hangingPunct="1">
-                        <a:lnSpc>
-                          <a:spcPct val="115000"/>
-                        </a:lnSpc>
-                        <a:spcBef>
-                          <a:spcPts val="0"/>
-                        </a:spcBef>
-                        <a:spcAft>
-                          <a:spcPts val="0"/>
-                        </a:spcAft>
-                        <a:buClrTx/>
-                        <a:buSzTx/>
-                        <a:buFontTx/>
-                        <a:buNone/>
-                        <a:tabLst/>
-                        <a:defRPr/>
-                      </a:pPr>
-                      <a:r>
-                        <a:rPr lang="en-US" sz="1100" dirty="0">
-                          <a:latin typeface="Calibri"/>
-                          <a:ea typeface="Calibri"/>
-                          <a:cs typeface="Times New Roman"/>
-                        </a:rPr>
-                        <a:t>Instanced rendering</a:t>
-                      </a:r>
-                    </a:p>
-                  </a:txBody>
-                  <a:tcPr marL="68580" marR="68580" marT="0" marB="0">
-                    <a:lnL w="12700" cap="flat" cmpd="sng" algn="ctr">
-                      <a:solidFill>
-                        <a:srgbClr val="000000"/>
-                      </a:solidFill>
-                      <a:prstDash val="solid"/>
-                      <a:round/>
-                      <a:headEnd type="none" w="med" len="med"/>
-                      <a:tailEnd type="none" w="med" len="med"/>
-                    </a:lnL>
-                    <a:lnR w="12700" cap="flat" cmpd="sng" algn="ctr">
-                      <a:solidFill>
-                        <a:srgbClr val="000000"/>
-                      </a:solidFill>
-                      <a:prstDash val="solid"/>
-                      <a:round/>
-                      <a:headEnd type="none" w="med" len="med"/>
-                      <a:tailEnd type="none" w="med" len="med"/>
-                    </a:lnR>
-                    <a:lnT w="12700" cap="flat" cmpd="sng" algn="ctr">
-                      <a:solidFill>
-                        <a:srgbClr val="000000"/>
-                      </a:solidFill>
-                      <a:prstDash val="solid"/>
-                      <a:round/>
-                      <a:headEnd type="none" w="med" len="med"/>
-                      <a:tailEnd type="none" w="med" len="med"/>
-                    </a:lnT>
-                    <a:lnB w="12700" cap="flat" cmpd="sng" algn="ctr">
-                      <a:solidFill>
-                        <a:srgbClr val="000000"/>
-                      </a:solidFill>
-                      <a:prstDash val="solid"/>
-                      <a:round/>
-                      <a:headEnd type="none" w="med" len="med"/>
-                      <a:tailEnd type="none" w="med" len="med"/>
-                    </a:lnB>
-                    <a:solidFill>
-                      <a:srgbClr val="FFFFCC"/>
-                    </a:solidFill>
-                  </a:tcPr>
-                </a:tc>
-                <a:extLst>
-                  <a:ext uri="{0D108BD9-81ED-4DB2-BD59-A6C34878D82A}">
-                    <a16:rowId xmlns:a16="http://schemas.microsoft.com/office/drawing/2014/main" val="10006"/>
-                  </a:ext>
-                </a:extLst>
-              </a:tr>
-              <a:tr h="205248">
-                <a:tc>
-                  <a:txBody>
-                    <a:bodyPr/>
-                    <a:lstStyle/>
-                    <a:p>
-                      <a:pPr marL="0" marR="0" indent="0" algn="ctr" defTabSz="914400" rtl="0" eaLnBrk="1" fontAlgn="auto" latinLnBrk="0" hangingPunct="1">
-                        <a:lnSpc>
-                          <a:spcPct val="115000"/>
-                        </a:lnSpc>
-                        <a:spcBef>
-                          <a:spcPts val="0"/>
-                        </a:spcBef>
-                        <a:spcAft>
-                          <a:spcPts val="0"/>
-                        </a:spcAft>
-                        <a:buClrTx/>
-                        <a:buSzTx/>
-                        <a:buFontTx/>
-                        <a:buNone/>
-                        <a:tabLst/>
-                        <a:defRPr/>
-                      </a:pPr>
-                      <a:r>
-                        <a:rPr lang="en-CA" sz="1100" dirty="0">
-                          <a:latin typeface="Calibri"/>
-                          <a:ea typeface="Calibri"/>
-                          <a:cs typeface="Times New Roman"/>
-                        </a:rPr>
-                        <a:t>Week 10</a:t>
-                      </a:r>
-                    </a:p>
-                  </a:txBody>
-                  <a:tcPr marL="68580" marR="68580" marT="0" marB="0">
-                    <a:lnL w="12700" cap="flat" cmpd="sng" algn="ctr">
-                      <a:solidFill>
-                        <a:srgbClr val="000000"/>
-                      </a:solidFill>
-                      <a:prstDash val="solid"/>
-                      <a:round/>
-                      <a:headEnd type="none" w="med" len="med"/>
-                      <a:tailEnd type="none" w="med" len="med"/>
-                    </a:lnL>
-                    <a:lnR w="12700" cap="flat" cmpd="sng" algn="ctr">
-                      <a:solidFill>
-                        <a:srgbClr val="000000"/>
-                      </a:solidFill>
-                      <a:prstDash val="solid"/>
-                      <a:round/>
-                      <a:headEnd type="none" w="med" len="med"/>
-                      <a:tailEnd type="none" w="med" len="med"/>
-                    </a:lnR>
-                    <a:lnT w="12700" cap="flat" cmpd="sng" algn="ctr">
-                      <a:solidFill>
-                        <a:srgbClr val="000000"/>
-                      </a:solidFill>
-                      <a:prstDash val="solid"/>
-                      <a:round/>
-                      <a:headEnd type="none" w="med" len="med"/>
-                      <a:tailEnd type="none" w="med" len="med"/>
-                    </a:lnT>
-                    <a:lnB w="12700" cap="flat" cmpd="sng" algn="ctr">
-                      <a:solidFill>
-                        <a:srgbClr val="000000"/>
-                      </a:solidFill>
-                      <a:prstDash val="solid"/>
-                      <a:round/>
-                      <a:headEnd type="none" w="med" len="med"/>
-                      <a:tailEnd type="none" w="med" len="med"/>
-                    </a:lnB>
-                    <a:solidFill>
-                      <a:srgbClr val="FFFFCC"/>
-                    </a:solidFill>
-                  </a:tcPr>
-                </a:tc>
-                <a:tc>
-                  <a:txBody>
-                    <a:bodyPr/>
-                    <a:lstStyle/>
-                    <a:p>
-                      <a:pPr marL="0" marR="0" indent="0" algn="l" defTabSz="914400" rtl="0" eaLnBrk="1" fontAlgn="auto" latinLnBrk="0" hangingPunct="1">
-                        <a:lnSpc>
-                          <a:spcPct val="115000"/>
-                        </a:lnSpc>
-                        <a:spcBef>
-                          <a:spcPts val="0"/>
-                        </a:spcBef>
-                        <a:spcAft>
-                          <a:spcPts val="0"/>
-                        </a:spcAft>
-                        <a:buClrTx/>
-                        <a:buSzTx/>
-                        <a:buFontTx/>
-                        <a:buNone/>
-                        <a:tabLst/>
-                        <a:defRPr/>
-                      </a:pPr>
-                      <a:r>
-                        <a:rPr lang="en-US" sz="1100" dirty="0">
-                          <a:latin typeface="Calibri"/>
-                          <a:ea typeface="Calibri"/>
-                          <a:cs typeface="Times New Roman"/>
-                        </a:rPr>
-                        <a:t>Deferred rendering,</a:t>
-                      </a:r>
-                      <a:r>
-                        <a:rPr lang="en-US" sz="1100" baseline="0" dirty="0">
-                          <a:latin typeface="Calibri"/>
-                          <a:ea typeface="Calibri"/>
-                          <a:cs typeface="Times New Roman"/>
-                        </a:rPr>
-                        <a:t> part 2: Light volumes</a:t>
-                      </a:r>
-                      <a:endParaRPr lang="en-US" sz="1100" dirty="0">
-                        <a:latin typeface="Calibri"/>
-                        <a:ea typeface="Calibri"/>
-                        <a:cs typeface="Times New Roman"/>
-                      </a:endParaRPr>
-                    </a:p>
-                  </a:txBody>
-                  <a:tcPr marL="68580" marR="68580" marT="0" marB="0">
-                    <a:lnL w="12700" cap="flat" cmpd="sng" algn="ctr">
-                      <a:solidFill>
-                        <a:srgbClr val="000000"/>
-                      </a:solidFill>
-                      <a:prstDash val="solid"/>
-                      <a:round/>
-                      <a:headEnd type="none" w="med" len="med"/>
-                      <a:tailEnd type="none" w="med" len="med"/>
-                    </a:lnL>
-                    <a:lnR w="12700" cap="flat" cmpd="sng" algn="ctr">
-                      <a:solidFill>
-                        <a:srgbClr val="000000"/>
-                      </a:solidFill>
-                      <a:prstDash val="solid"/>
-                      <a:round/>
-                      <a:headEnd type="none" w="med" len="med"/>
-                      <a:tailEnd type="none" w="med" len="med"/>
-                    </a:lnR>
-                    <a:lnT w="12700" cap="flat" cmpd="sng" algn="ctr">
-                      <a:solidFill>
-                        <a:srgbClr val="000000"/>
-                      </a:solidFill>
-                      <a:prstDash val="solid"/>
-                      <a:round/>
-                      <a:headEnd type="none" w="med" len="med"/>
-                      <a:tailEnd type="none" w="med" len="med"/>
-                    </a:lnT>
-                    <a:lnB w="12700" cap="flat" cmpd="sng" algn="ctr">
-                      <a:solidFill>
-                        <a:srgbClr val="000000"/>
-                      </a:solidFill>
-                      <a:prstDash val="solid"/>
-                      <a:round/>
-                      <a:headEnd type="none" w="med" len="med"/>
-                      <a:tailEnd type="none" w="med" len="med"/>
-                    </a:lnB>
-                    <a:solidFill>
-                      <a:srgbClr val="FFFFCC"/>
-                    </a:solidFill>
-                  </a:tcPr>
-                </a:tc>
-                <a:extLst>
-                  <a:ext uri="{0D108BD9-81ED-4DB2-BD59-A6C34878D82A}">
-                    <a16:rowId xmlns:a16="http://schemas.microsoft.com/office/drawing/2014/main" val="10007"/>
-                  </a:ext>
-                </a:extLst>
-              </a:tr>
-              <a:tr h="139924">
-                <a:tc>
-                  <a:txBody>
-                    <a:bodyPr/>
-                    <a:lstStyle/>
-                    <a:p>
-                      <a:pPr marL="0" marR="0" indent="0" algn="ctr" defTabSz="914400" rtl="0" eaLnBrk="1" fontAlgn="auto" latinLnBrk="0" hangingPunct="1">
-                        <a:lnSpc>
-                          <a:spcPct val="115000"/>
-                        </a:lnSpc>
-                        <a:spcBef>
-                          <a:spcPts val="0"/>
-                        </a:spcBef>
-                        <a:spcAft>
-                          <a:spcPts val="0"/>
-                        </a:spcAft>
-                        <a:buClrTx/>
-                        <a:buSzTx/>
-                        <a:buFontTx/>
-                        <a:buNone/>
-                        <a:tabLst/>
-                        <a:defRPr/>
-                      </a:pPr>
-                      <a:r>
-                        <a:rPr lang="en-CA" sz="1100" dirty="0">
-                          <a:latin typeface="Calibri"/>
-                          <a:ea typeface="Calibri"/>
-                          <a:cs typeface="Times New Roman"/>
-                        </a:rPr>
-                        <a:t>Week 11</a:t>
-                      </a:r>
-                    </a:p>
-                  </a:txBody>
-                  <a:tcPr marL="68580" marR="68580" marT="0" marB="0">
-                    <a:lnL w="12700" cap="flat" cmpd="sng" algn="ctr">
-                      <a:solidFill>
-                        <a:srgbClr val="000000"/>
-                      </a:solidFill>
-                      <a:prstDash val="solid"/>
-                      <a:round/>
-                      <a:headEnd type="none" w="med" len="med"/>
-                      <a:tailEnd type="none" w="med" len="med"/>
-                    </a:lnL>
-                    <a:lnR w="12700" cap="flat" cmpd="sng" algn="ctr">
-                      <a:solidFill>
-                        <a:srgbClr val="000000"/>
-                      </a:solidFill>
-                      <a:prstDash val="solid"/>
-                      <a:round/>
-                      <a:headEnd type="none" w="med" len="med"/>
-                      <a:tailEnd type="none" w="med" len="med"/>
-                    </a:lnR>
-                    <a:lnT w="12700" cap="flat" cmpd="sng" algn="ctr">
-                      <a:solidFill>
-                        <a:srgbClr val="000000"/>
-                      </a:solidFill>
-                      <a:prstDash val="solid"/>
-                      <a:round/>
-                      <a:headEnd type="none" w="med" len="med"/>
-                      <a:tailEnd type="none" w="med" len="med"/>
-                    </a:lnT>
-                    <a:lnB w="12700" cap="flat" cmpd="sng" algn="ctr">
-                      <a:solidFill>
-                        <a:srgbClr val="000000"/>
-                      </a:solidFill>
-                      <a:prstDash val="solid"/>
-                      <a:round/>
-                      <a:headEnd type="none" w="med" len="med"/>
-                      <a:tailEnd type="none" w="med" len="med"/>
-                    </a:lnB>
-                    <a:solidFill>
-                      <a:srgbClr val="FFFFCC"/>
-                    </a:solidFill>
-                  </a:tcPr>
-                </a:tc>
-                <a:tc>
-                  <a:txBody>
-                    <a:bodyPr/>
-                    <a:lstStyle/>
-                    <a:p>
-                      <a:pPr marL="0" marR="0" indent="0" algn="l" defTabSz="914400" rtl="0" eaLnBrk="1" fontAlgn="auto" latinLnBrk="0" hangingPunct="1">
-                        <a:lnSpc>
-                          <a:spcPct val="115000"/>
-                        </a:lnSpc>
-                        <a:spcBef>
-                          <a:spcPts val="0"/>
-                        </a:spcBef>
-                        <a:spcAft>
-                          <a:spcPts val="0"/>
-                        </a:spcAft>
-                        <a:buClrTx/>
-                        <a:buSzTx/>
-                        <a:buFontTx/>
-                        <a:buNone/>
-                        <a:tabLst/>
-                        <a:defRPr/>
-                      </a:pPr>
-                      <a:r>
-                        <a:rPr lang="en-CA" sz="1100" dirty="0">
-                          <a:latin typeface="Calibri"/>
-                          <a:ea typeface="Calibri"/>
-                          <a:cs typeface="Times New Roman"/>
-                        </a:rPr>
-                        <a:t>Bump/Normal mapping</a:t>
-                      </a:r>
-                    </a:p>
-                  </a:txBody>
-                  <a:tcPr marL="68580" marR="68580" marT="0" marB="0">
-                    <a:lnL w="12700" cap="flat" cmpd="sng" algn="ctr">
-                      <a:solidFill>
-                        <a:srgbClr val="000000"/>
-                      </a:solidFill>
-                      <a:prstDash val="solid"/>
-                      <a:round/>
-                      <a:headEnd type="none" w="med" len="med"/>
-                      <a:tailEnd type="none" w="med" len="med"/>
-                    </a:lnL>
-                    <a:lnR w="12700" cap="flat" cmpd="sng" algn="ctr">
-                      <a:solidFill>
-                        <a:srgbClr val="000000"/>
-                      </a:solidFill>
-                      <a:prstDash val="solid"/>
-                      <a:round/>
-                      <a:headEnd type="none" w="med" len="med"/>
-                      <a:tailEnd type="none" w="med" len="med"/>
-                    </a:lnR>
-                    <a:lnT w="12700" cap="flat" cmpd="sng" algn="ctr">
-                      <a:solidFill>
-                        <a:srgbClr val="000000"/>
-                      </a:solidFill>
-                      <a:prstDash val="solid"/>
-                      <a:round/>
-                      <a:headEnd type="none" w="med" len="med"/>
-                      <a:tailEnd type="none" w="med" len="med"/>
-                    </a:lnT>
-                    <a:lnB w="12700" cap="flat" cmpd="sng" algn="ctr">
-                      <a:solidFill>
-                        <a:srgbClr val="000000"/>
-                      </a:solidFill>
-                      <a:prstDash val="solid"/>
-                      <a:round/>
-                      <a:headEnd type="none" w="med" len="med"/>
-                      <a:tailEnd type="none" w="med" len="med"/>
-                    </a:lnB>
-                    <a:solidFill>
-                      <a:srgbClr val="FFFFCC"/>
-                    </a:solidFill>
-                  </a:tcPr>
-                </a:tc>
-                <a:extLst>
-                  <a:ext uri="{0D108BD9-81ED-4DB2-BD59-A6C34878D82A}">
-                    <a16:rowId xmlns:a16="http://schemas.microsoft.com/office/drawing/2014/main" val="10008"/>
-                  </a:ext>
-                </a:extLst>
-              </a:tr>
-              <a:tr h="187041">
-                <a:tc>
-                  <a:txBody>
-                    <a:bodyPr/>
-                    <a:lstStyle/>
-                    <a:p>
-                      <a:pPr algn="ctr">
-                        <a:lnSpc>
-                          <a:spcPct val="115000"/>
-                        </a:lnSpc>
-                        <a:spcAft>
-                          <a:spcPts val="0"/>
-                        </a:spcAft>
-                      </a:pPr>
-                      <a:r>
-                        <a:rPr lang="en-CA" sz="1100" dirty="0">
-                          <a:latin typeface="Calibri"/>
-                          <a:ea typeface="Calibri"/>
-                          <a:cs typeface="Times New Roman"/>
-                        </a:rPr>
-                        <a:t>Week 12</a:t>
-                      </a:r>
-                    </a:p>
-                  </a:txBody>
-                  <a:tcPr marL="68580" marR="68580" marT="0" marB="0">
-                    <a:lnL w="12700" cap="flat" cmpd="sng" algn="ctr">
-                      <a:solidFill>
-                        <a:srgbClr val="000000"/>
-                      </a:solidFill>
-                      <a:prstDash val="solid"/>
-                      <a:round/>
-                      <a:headEnd type="none" w="med" len="med"/>
-                      <a:tailEnd type="none" w="med" len="med"/>
-                    </a:lnL>
-                    <a:lnR w="12700" cap="flat" cmpd="sng" algn="ctr">
-                      <a:solidFill>
-                        <a:srgbClr val="000000"/>
-                      </a:solidFill>
-                      <a:prstDash val="solid"/>
-                      <a:round/>
-                      <a:headEnd type="none" w="med" len="med"/>
-                      <a:tailEnd type="none" w="med" len="med"/>
-                    </a:lnR>
-                    <a:lnT w="12700" cap="flat" cmpd="sng" algn="ctr">
-                      <a:solidFill>
-                        <a:srgbClr val="000000"/>
-                      </a:solidFill>
-                      <a:prstDash val="solid"/>
-                      <a:round/>
-                      <a:headEnd type="none" w="med" len="med"/>
-                      <a:tailEnd type="none" w="med" len="med"/>
-                    </a:lnT>
-                    <a:lnB w="12700" cap="flat" cmpd="sng" algn="ctr">
-                      <a:solidFill>
-                        <a:srgbClr val="000000"/>
-                      </a:solidFill>
-                      <a:prstDash val="solid"/>
-                      <a:round/>
-                      <a:headEnd type="none" w="med" len="med"/>
-                      <a:tailEnd type="none" w="med" len="med"/>
-                    </a:lnB>
-                    <a:solidFill>
-                      <a:srgbClr val="FFFFCC"/>
-                    </a:solidFill>
-                  </a:tcPr>
-                </a:tc>
-                <a:tc>
-                  <a:txBody>
-                    <a:bodyPr/>
-                    <a:lstStyle/>
-                    <a:p>
-                      <a:pPr marL="0" marR="0" indent="0" algn="l" defTabSz="914400" rtl="0" eaLnBrk="1" fontAlgn="auto" latinLnBrk="0" hangingPunct="1">
-                        <a:lnSpc>
-                          <a:spcPct val="115000"/>
-                        </a:lnSpc>
-                        <a:spcBef>
-                          <a:spcPts val="0"/>
-                        </a:spcBef>
-                        <a:spcAft>
-                          <a:spcPts val="0"/>
-                        </a:spcAft>
-                        <a:buClrTx/>
-                        <a:buSzTx/>
-                        <a:buFontTx/>
-                        <a:buNone/>
-                        <a:tabLst/>
-                        <a:defRPr/>
-                      </a:pPr>
-                      <a:r>
-                        <a:rPr lang="en-CA" sz="1100" dirty="0">
-                          <a:latin typeface="Calibri"/>
-                          <a:ea typeface="Calibri"/>
-                          <a:cs typeface="Times New Roman"/>
-                        </a:rPr>
-                        <a:t>Bitmap shadows</a:t>
-                      </a:r>
-                    </a:p>
-                  </a:txBody>
-                  <a:tcPr marL="68580" marR="68580" marT="0" marB="0">
-                    <a:lnL w="12700" cap="flat" cmpd="sng" algn="ctr">
-                      <a:solidFill>
-                        <a:srgbClr val="000000"/>
-                      </a:solidFill>
-                      <a:prstDash val="solid"/>
-                      <a:round/>
-                      <a:headEnd type="none" w="med" len="med"/>
-                      <a:tailEnd type="none" w="med" len="med"/>
-                    </a:lnL>
-                    <a:lnR w="12700" cap="flat" cmpd="sng" algn="ctr">
-                      <a:solidFill>
-                        <a:srgbClr val="000000"/>
-                      </a:solidFill>
-                      <a:prstDash val="solid"/>
-                      <a:round/>
-                      <a:headEnd type="none" w="med" len="med"/>
-                      <a:tailEnd type="none" w="med" len="med"/>
-                    </a:lnR>
-                    <a:lnT w="12700" cap="flat" cmpd="sng" algn="ctr">
-                      <a:solidFill>
-                        <a:srgbClr val="000000"/>
-                      </a:solidFill>
-                      <a:prstDash val="solid"/>
-                      <a:round/>
-                      <a:headEnd type="none" w="med" len="med"/>
-                      <a:tailEnd type="none" w="med" len="med"/>
-                    </a:lnT>
-                    <a:lnB w="12700" cap="flat" cmpd="sng" algn="ctr">
-                      <a:solidFill>
-                        <a:srgbClr val="000000"/>
-                      </a:solidFill>
-                      <a:prstDash val="solid"/>
-                      <a:round/>
-                      <a:headEnd type="none" w="med" len="med"/>
-                      <a:tailEnd type="none" w="med" len="med"/>
-                    </a:lnB>
-                    <a:solidFill>
-                      <a:srgbClr val="FFFFCC"/>
-                    </a:solidFill>
-                  </a:tcPr>
-                </a:tc>
-                <a:extLst>
-                  <a:ext uri="{0D108BD9-81ED-4DB2-BD59-A6C34878D82A}">
-                    <a16:rowId xmlns:a16="http://schemas.microsoft.com/office/drawing/2014/main" val="10009"/>
-                  </a:ext>
-                </a:extLst>
-              </a:tr>
-              <a:tr h="161676">
-                <a:tc>
-                  <a:txBody>
-                    <a:bodyPr/>
-                    <a:lstStyle/>
-                    <a:p>
-                      <a:pPr algn="ctr">
-                        <a:lnSpc>
-                          <a:spcPct val="115000"/>
-                        </a:lnSpc>
-                        <a:spcAft>
-                          <a:spcPts val="0"/>
-                        </a:spcAft>
-                      </a:pPr>
-                      <a:r>
-                        <a:rPr lang="en-CA" sz="1100" dirty="0">
-                          <a:latin typeface="Calibri"/>
-                          <a:ea typeface="Calibri"/>
-                          <a:cs typeface="Times New Roman"/>
-                        </a:rPr>
-                        <a:t>Week 13</a:t>
-                      </a:r>
-                    </a:p>
-                  </a:txBody>
-                  <a:tcPr marL="68580" marR="68580" marT="0" marB="0">
-                    <a:lnL w="12700" cap="flat" cmpd="sng" algn="ctr">
-                      <a:solidFill>
-                        <a:srgbClr val="000000"/>
-                      </a:solidFill>
-                      <a:prstDash val="solid"/>
-                      <a:round/>
-                      <a:headEnd type="none" w="med" len="med"/>
-                      <a:tailEnd type="none" w="med" len="med"/>
-                    </a:lnL>
-                    <a:lnR w="12700" cap="flat" cmpd="sng" algn="ctr">
-                      <a:solidFill>
-                        <a:srgbClr val="000000"/>
-                      </a:solidFill>
-                      <a:prstDash val="solid"/>
-                      <a:round/>
-                      <a:headEnd type="none" w="med" len="med"/>
-                      <a:tailEnd type="none" w="med" len="med"/>
-                    </a:lnR>
-                    <a:lnT w="12700" cap="flat" cmpd="sng" algn="ctr">
-                      <a:solidFill>
-                        <a:srgbClr val="000000"/>
-                      </a:solidFill>
-                      <a:prstDash val="solid"/>
-                      <a:round/>
-                      <a:headEnd type="none" w="med" len="med"/>
-                      <a:tailEnd type="none" w="med" len="med"/>
-                    </a:lnT>
-                    <a:lnB w="12700" cap="flat" cmpd="sng" algn="ctr">
-                      <a:solidFill>
-                        <a:srgbClr val="000000"/>
-                      </a:solidFill>
-                      <a:prstDash val="solid"/>
-                      <a:round/>
-                      <a:headEnd type="none" w="med" len="med"/>
-                      <a:tailEnd type="none" w="med" len="med"/>
-                    </a:lnB>
-                    <a:solidFill>
-                      <a:srgbClr val="FFFFCC"/>
-                    </a:solidFill>
-                  </a:tcPr>
-                </a:tc>
-                <a:tc>
-                  <a:txBody>
-                    <a:bodyPr/>
-                    <a:lstStyle/>
-                    <a:p>
-                      <a:pPr marL="0" marR="0" indent="0" algn="l" defTabSz="914400" rtl="0" eaLnBrk="1" fontAlgn="auto" latinLnBrk="0" hangingPunct="1">
-                        <a:lnSpc>
-                          <a:spcPct val="115000"/>
-                        </a:lnSpc>
-                        <a:spcBef>
-                          <a:spcPts val="0"/>
-                        </a:spcBef>
-                        <a:spcAft>
-                          <a:spcPts val="0"/>
-                        </a:spcAft>
-                        <a:buClrTx/>
-                        <a:buSzTx/>
-                        <a:buFontTx/>
-                        <a:buNone/>
-                        <a:tabLst/>
-                        <a:defRPr/>
-                      </a:pPr>
-                      <a:r>
-                        <a:rPr lang="en-CA" sz="1100" dirty="0">
-                          <a:latin typeface="Calibri"/>
-                          <a:ea typeface="Calibri"/>
-                          <a:cs typeface="Times New Roman"/>
-                        </a:rPr>
-                        <a:t>Compute </a:t>
-                      </a:r>
-                      <a:r>
-                        <a:rPr lang="en-CA" sz="1100" dirty="0" err="1">
-                          <a:latin typeface="Calibri"/>
-                          <a:ea typeface="Calibri"/>
-                          <a:cs typeface="Times New Roman"/>
-                        </a:rPr>
-                        <a:t>Shader</a:t>
-                      </a:r>
-                      <a:r>
-                        <a:rPr lang="en-CA" sz="1100" dirty="0">
-                          <a:latin typeface="Calibri"/>
-                          <a:ea typeface="Calibri"/>
-                          <a:cs typeface="Times New Roman"/>
-                        </a:rPr>
-                        <a:t>: non-graphics uses</a:t>
-                      </a:r>
-                      <a:r>
-                        <a:rPr lang="en-CA" sz="1100" baseline="0" dirty="0">
-                          <a:latin typeface="Calibri"/>
-                          <a:ea typeface="Calibri"/>
-                          <a:cs typeface="Times New Roman"/>
-                        </a:rPr>
-                        <a:t> and graphical uses (</a:t>
-                      </a:r>
-                      <a:r>
-                        <a:rPr lang="en-CA" sz="1100" dirty="0">
-                          <a:latin typeface="Calibri"/>
-                          <a:ea typeface="Calibri"/>
-                          <a:cs typeface="Times New Roman"/>
-                        </a:rPr>
-                        <a:t>“Forward+” deferred rendering alternative, etc.)</a:t>
-                      </a:r>
-                    </a:p>
-                  </a:txBody>
-                  <a:tcPr marL="68580" marR="68580" marT="0" marB="0">
-                    <a:lnL w="12700" cap="flat" cmpd="sng" algn="ctr">
-                      <a:solidFill>
-                        <a:srgbClr val="000000"/>
-                      </a:solidFill>
-                      <a:prstDash val="solid"/>
-                      <a:round/>
-                      <a:headEnd type="none" w="med" len="med"/>
-                      <a:tailEnd type="none" w="med" len="med"/>
-                    </a:lnL>
-                    <a:lnR w="12700" cap="flat" cmpd="sng" algn="ctr">
-                      <a:solidFill>
-                        <a:srgbClr val="000000"/>
-                      </a:solidFill>
-                      <a:prstDash val="solid"/>
-                      <a:round/>
-                      <a:headEnd type="none" w="med" len="med"/>
-                      <a:tailEnd type="none" w="med" len="med"/>
-                    </a:lnR>
-                    <a:lnT w="12700" cap="flat" cmpd="sng" algn="ctr">
-                      <a:solidFill>
-                        <a:srgbClr val="000000"/>
-                      </a:solidFill>
-                      <a:prstDash val="solid"/>
-                      <a:round/>
-                      <a:headEnd type="none" w="med" len="med"/>
-                      <a:tailEnd type="none" w="med" len="med"/>
-                    </a:lnT>
-                    <a:lnB w="12700" cap="flat" cmpd="sng" algn="ctr">
-                      <a:solidFill>
-                        <a:srgbClr val="000000"/>
-                      </a:solidFill>
-                      <a:prstDash val="solid"/>
-                      <a:round/>
-                      <a:headEnd type="none" w="med" len="med"/>
-                      <a:tailEnd type="none" w="med" len="med"/>
-                    </a:lnB>
-                    <a:solidFill>
-                      <a:srgbClr val="FFFFCC"/>
-                    </a:solidFill>
-                  </a:tcPr>
-                </a:tc>
-                <a:extLst>
-                  <a:ext uri="{0D108BD9-81ED-4DB2-BD59-A6C34878D82A}">
-                    <a16:rowId xmlns:a16="http://schemas.microsoft.com/office/drawing/2014/main" val="10010"/>
-                  </a:ext>
-                </a:extLst>
-              </a:tr>
-              <a:tr h="132206">
-                <a:tc>
-                  <a:txBody>
-                    <a:bodyPr/>
-                    <a:lstStyle/>
-                    <a:p>
-                      <a:pPr algn="ctr">
-                        <a:lnSpc>
-                          <a:spcPct val="115000"/>
-                        </a:lnSpc>
-                        <a:spcAft>
-                          <a:spcPts val="0"/>
-                        </a:spcAft>
-                      </a:pPr>
-                      <a:r>
-                        <a:rPr lang="en-CA" sz="1100" dirty="0">
-                          <a:latin typeface="Calibri"/>
-                          <a:ea typeface="Calibri"/>
-                          <a:cs typeface="Times New Roman"/>
-                        </a:rPr>
-                        <a:t>Week 14</a:t>
-                      </a:r>
-                    </a:p>
-                  </a:txBody>
-                  <a:tcPr marL="68580" marR="68580" marT="0" marB="0">
-                    <a:lnL w="12700" cap="flat" cmpd="sng" algn="ctr">
-                      <a:solidFill>
-                        <a:srgbClr val="000000"/>
-                      </a:solidFill>
-                      <a:prstDash val="solid"/>
-                      <a:round/>
-                      <a:headEnd type="none" w="med" len="med"/>
-                      <a:tailEnd type="none" w="med" len="med"/>
-                    </a:lnL>
-                    <a:lnR w="12700" cap="flat" cmpd="sng" algn="ctr">
-                      <a:solidFill>
-                        <a:srgbClr val="000000"/>
-                      </a:solidFill>
-                      <a:prstDash val="solid"/>
-                      <a:round/>
-                      <a:headEnd type="none" w="med" len="med"/>
-                      <a:tailEnd type="none" w="med" len="med"/>
-                    </a:lnR>
-                    <a:lnT w="12700" cap="flat" cmpd="sng" algn="ctr">
-                      <a:solidFill>
-                        <a:srgbClr val="000000"/>
-                      </a:solidFill>
-                      <a:prstDash val="solid"/>
-                      <a:round/>
-                      <a:headEnd type="none" w="med" len="med"/>
-                      <a:tailEnd type="none" w="med" len="med"/>
-                    </a:lnT>
-                    <a:lnB w="12700" cap="flat" cmpd="sng" algn="ctr">
-                      <a:solidFill>
-                        <a:srgbClr val="000000"/>
-                      </a:solidFill>
-                      <a:prstDash val="solid"/>
-                      <a:round/>
-                      <a:headEnd type="none" w="med" len="med"/>
-                      <a:tailEnd type="none" w="med" len="med"/>
-                    </a:lnB>
-                    <a:solidFill>
-                      <a:srgbClr val="FFFFCC"/>
-                    </a:solidFill>
-                  </a:tcPr>
-                </a:tc>
-                <a:tc>
-                  <a:txBody>
-                    <a:bodyPr/>
-                    <a:lstStyle/>
-                    <a:p>
-                      <a:pPr marL="0" marR="0" indent="0" algn="l" defTabSz="914400" rtl="0" eaLnBrk="1" fontAlgn="auto" latinLnBrk="0" hangingPunct="1">
-                        <a:lnSpc>
-                          <a:spcPct val="115000"/>
-                        </a:lnSpc>
-                        <a:spcBef>
-                          <a:spcPts val="0"/>
-                        </a:spcBef>
-                        <a:spcAft>
-                          <a:spcPts val="0"/>
-                        </a:spcAft>
-                        <a:buClrTx/>
-                        <a:buSzTx/>
-                        <a:buFontTx/>
-                        <a:buNone/>
-                        <a:tabLst/>
-                        <a:defRPr/>
-                      </a:pPr>
-                      <a:r>
-                        <a:rPr lang="en-CA" sz="1100" dirty="0">
-                          <a:latin typeface="Calibri"/>
-                          <a:ea typeface="Calibri"/>
-                          <a:cs typeface="Times New Roman"/>
-                        </a:rPr>
-                        <a:t>Additional</a:t>
-                      </a:r>
-                      <a:r>
-                        <a:rPr lang="en-CA" sz="1100" baseline="0" dirty="0">
-                          <a:latin typeface="Calibri"/>
-                          <a:ea typeface="Calibri"/>
-                          <a:cs typeface="Times New Roman"/>
-                        </a:rPr>
-                        <a:t> topics as time permits: Ray tracing (RTX/</a:t>
-                      </a:r>
-                      <a:r>
-                        <a:rPr lang="en-CA" sz="1100" baseline="0" dirty="0" err="1">
-                          <a:latin typeface="Calibri"/>
-                          <a:ea typeface="Calibri"/>
-                          <a:cs typeface="Times New Roman"/>
-                        </a:rPr>
-                        <a:t>Vulkan</a:t>
-                      </a:r>
-                      <a:r>
-                        <a:rPr lang="en-CA" sz="1100" baseline="0" dirty="0">
-                          <a:latin typeface="Calibri"/>
-                          <a:ea typeface="Calibri"/>
-                          <a:cs typeface="Times New Roman"/>
-                        </a:rPr>
-                        <a:t>), mesh </a:t>
-                      </a:r>
-                      <a:r>
-                        <a:rPr lang="en-CA" sz="1100" baseline="0" dirty="0" err="1">
-                          <a:latin typeface="Calibri"/>
-                          <a:ea typeface="Calibri"/>
-                          <a:cs typeface="Times New Roman"/>
-                        </a:rPr>
-                        <a:t>shaders</a:t>
-                      </a:r>
-                      <a:r>
-                        <a:rPr lang="en-CA" sz="1100" baseline="0" dirty="0">
-                          <a:latin typeface="Calibri"/>
-                          <a:ea typeface="Calibri"/>
-                          <a:cs typeface="Times New Roman"/>
-                        </a:rPr>
-                        <a:t>, HDR (High Dynamic Range), etc.</a:t>
-                      </a:r>
-                      <a:endParaRPr lang="en-CA" sz="1100" dirty="0">
-                        <a:latin typeface="Calibri"/>
-                        <a:ea typeface="Calibri"/>
-                        <a:cs typeface="Times New Roman"/>
-                      </a:endParaRPr>
-                    </a:p>
-                  </a:txBody>
-                  <a:tcPr marL="68580" marR="68580" marT="0" marB="0">
-                    <a:lnL w="12700" cap="flat" cmpd="sng" algn="ctr">
-                      <a:solidFill>
-                        <a:srgbClr val="000000"/>
-                      </a:solidFill>
-                      <a:prstDash val="solid"/>
-                      <a:round/>
-                      <a:headEnd type="none" w="med" len="med"/>
-                      <a:tailEnd type="none" w="med" len="med"/>
-                    </a:lnL>
-                    <a:lnR w="12700" cap="flat" cmpd="sng" algn="ctr">
-                      <a:solidFill>
-                        <a:srgbClr val="000000"/>
-                      </a:solidFill>
-                      <a:prstDash val="solid"/>
-                      <a:round/>
-                      <a:headEnd type="none" w="med" len="med"/>
-                      <a:tailEnd type="none" w="med" len="med"/>
-                    </a:lnR>
-                    <a:lnT w="12700" cap="flat" cmpd="sng" algn="ctr">
-                      <a:solidFill>
-                        <a:srgbClr val="000000"/>
-                      </a:solidFill>
-                      <a:prstDash val="solid"/>
-                      <a:round/>
-                      <a:headEnd type="none" w="med" len="med"/>
-                      <a:tailEnd type="none" w="med" len="med"/>
-                    </a:lnT>
-                    <a:lnB w="12700" cap="flat" cmpd="sng" algn="ctr">
-                      <a:solidFill>
-                        <a:srgbClr val="000000"/>
-                      </a:solidFill>
-                      <a:prstDash val="solid"/>
-                      <a:round/>
-                      <a:headEnd type="none" w="med" len="med"/>
-                      <a:tailEnd type="none" w="med" len="med"/>
-                    </a:lnB>
-                    <a:solidFill>
-                      <a:srgbClr val="FFFFCC"/>
-                    </a:solidFill>
-                  </a:tcPr>
-                </a:tc>
-                <a:extLst>
-                  <a:ext uri="{0D108BD9-81ED-4DB2-BD59-A6C34878D82A}">
-                    <a16:rowId xmlns:a16="http://schemas.microsoft.com/office/drawing/2014/main" val="10011"/>
-                  </a:ext>
-                </a:extLst>
-              </a:tr>
-              <a:tr h="132206">
-                <a:tc>
-                  <a:txBody>
-                    <a:bodyPr/>
-                    <a:lstStyle/>
-                    <a:p>
-                      <a:pPr algn="ctr">
-                        <a:lnSpc>
-                          <a:spcPct val="115000"/>
-                        </a:lnSpc>
-                        <a:spcAft>
-                          <a:spcPts val="0"/>
-                        </a:spcAft>
-                      </a:pPr>
-                      <a:r>
-                        <a:rPr lang="en-CA" sz="1100" dirty="0">
-                          <a:latin typeface="Calibri"/>
-                          <a:ea typeface="Calibri"/>
-                          <a:cs typeface="Times New Roman"/>
-                        </a:rPr>
-                        <a:t>“Week 15”</a:t>
-                      </a:r>
-                    </a:p>
-                  </a:txBody>
-                  <a:tcPr marL="68580" marR="68580" marT="0" marB="0">
-                    <a:lnL w="12700" cap="flat" cmpd="sng" algn="ctr">
-                      <a:solidFill>
-                        <a:srgbClr val="000000"/>
-                      </a:solidFill>
-                      <a:prstDash val="solid"/>
-                      <a:round/>
-                      <a:headEnd type="none" w="med" len="med"/>
-                      <a:tailEnd type="none" w="med" len="med"/>
-                    </a:lnL>
-                    <a:lnR w="12700" cap="flat" cmpd="sng" algn="ctr">
-                      <a:solidFill>
-                        <a:srgbClr val="000000"/>
-                      </a:solidFill>
-                      <a:prstDash val="solid"/>
-                      <a:round/>
-                      <a:headEnd type="none" w="med" len="med"/>
-                      <a:tailEnd type="none" w="med" len="med"/>
-                    </a:lnR>
-                    <a:lnT w="12700" cap="flat" cmpd="sng" algn="ctr">
-                      <a:solidFill>
-                        <a:srgbClr val="000000"/>
-                      </a:solidFill>
-                      <a:prstDash val="solid"/>
-                      <a:round/>
-                      <a:headEnd type="none" w="med" len="med"/>
-                      <a:tailEnd type="none" w="med" len="med"/>
-                    </a:lnT>
-                    <a:lnB w="12700" cap="flat" cmpd="sng" algn="ctr">
-                      <a:solidFill>
-                        <a:srgbClr val="000000"/>
-                      </a:solidFill>
-                      <a:prstDash val="solid"/>
-                      <a:round/>
-                      <a:headEnd type="none" w="med" len="med"/>
-                      <a:tailEnd type="none" w="med" len="med"/>
-                    </a:lnB>
-                    <a:solidFill>
-                      <a:srgbClr val="FFFFCC"/>
-                    </a:solidFill>
-                  </a:tcPr>
-                </a:tc>
-                <a:tc>
-                  <a:txBody>
-                    <a:bodyPr/>
-                    <a:lstStyle/>
-                    <a:p>
-                      <a:pPr marL="0" marR="0" indent="0" algn="l" defTabSz="914400" rtl="0" eaLnBrk="1" fontAlgn="auto" latinLnBrk="0" hangingPunct="1">
-                        <a:lnSpc>
-                          <a:spcPct val="115000"/>
-                        </a:lnSpc>
-                        <a:spcBef>
-                          <a:spcPts val="0"/>
-                        </a:spcBef>
-                        <a:spcAft>
-                          <a:spcPts val="0"/>
-                        </a:spcAft>
-                        <a:buClrTx/>
-                        <a:buSzTx/>
-                        <a:buFontTx/>
-                        <a:buNone/>
-                        <a:tabLst/>
-                        <a:defRPr/>
-                      </a:pPr>
-                      <a:r>
-                        <a:rPr lang="en-CA" sz="1100" dirty="0">
-                          <a:latin typeface="Calibri"/>
-                          <a:ea typeface="Calibri"/>
-                          <a:cs typeface="Times New Roman"/>
-                        </a:rPr>
-                        <a:t>Exam</a:t>
-                      </a:r>
-                      <a:r>
-                        <a:rPr lang="en-CA" sz="1100" baseline="0" dirty="0">
-                          <a:latin typeface="Calibri"/>
-                          <a:ea typeface="Calibri"/>
-                          <a:cs typeface="Times New Roman"/>
-                        </a:rPr>
-                        <a:t> week (Game Jam, Final Exam)</a:t>
-                      </a:r>
-                      <a:endParaRPr lang="en-CA" sz="1100" dirty="0">
-                        <a:latin typeface="Calibri"/>
-                        <a:ea typeface="Calibri"/>
-                        <a:cs typeface="Times New Roman"/>
-                      </a:endParaRPr>
-                    </a:p>
-                  </a:txBody>
-                  <a:tcPr marL="68580" marR="68580" marT="0" marB="0">
-                    <a:lnL w="12700" cap="flat" cmpd="sng" algn="ctr">
-                      <a:solidFill>
-                        <a:srgbClr val="000000"/>
-                      </a:solidFill>
-                      <a:prstDash val="solid"/>
-                      <a:round/>
-                      <a:headEnd type="none" w="med" len="med"/>
-                      <a:tailEnd type="none" w="med" len="med"/>
-                    </a:lnL>
-                    <a:lnR w="12700" cap="flat" cmpd="sng" algn="ctr">
-                      <a:solidFill>
-                        <a:srgbClr val="000000"/>
-                      </a:solidFill>
-                      <a:prstDash val="solid"/>
-                      <a:round/>
-                      <a:headEnd type="none" w="med" len="med"/>
-                      <a:tailEnd type="none" w="med" len="med"/>
-                    </a:lnR>
-                    <a:lnT w="12700" cap="flat" cmpd="sng" algn="ctr">
-                      <a:solidFill>
-                        <a:srgbClr val="000000"/>
-                      </a:solidFill>
-                      <a:prstDash val="solid"/>
-                      <a:round/>
-                      <a:headEnd type="none" w="med" len="med"/>
-                      <a:tailEnd type="none" w="med" len="med"/>
-                    </a:lnT>
-                    <a:lnB w="12700" cap="flat" cmpd="sng" algn="ctr">
-                      <a:solidFill>
-                        <a:srgbClr val="000000"/>
-                      </a:solidFill>
-                      <a:prstDash val="solid"/>
-                      <a:round/>
-                      <a:headEnd type="none" w="med" len="med"/>
-                      <a:tailEnd type="none" w="med" len="med"/>
-                    </a:lnB>
-                    <a:solidFill>
-                      <a:srgbClr val="FFFFCC"/>
-                    </a:solidFill>
-                  </a:tcPr>
-                </a:tc>
-                <a:extLst>
-                  <a:ext uri="{0D108BD9-81ED-4DB2-BD59-A6C34878D82A}">
-                    <a16:rowId xmlns:a16="http://schemas.microsoft.com/office/drawing/2014/main" val="10014"/>
-                  </a:ext>
-                </a:extLst>
-              </a:tr>
-            </a:tbl>
-          </a:graphicData>
-        </a:graphic>
-      </p:graphicFrame>
-      <p:sp>
-        <p:nvSpPr>
-          <p:cNvPr id="3" name="TextBox 2"/>
-          <p:cNvSpPr txBox="1"/>
-          <p:nvPr/>
-        </p:nvSpPr>
-        <p:spPr>
-          <a:xfrm>
-            <a:off x="609600" y="4629150"/>
-            <a:ext cx="7696200" cy="369332"/>
-          </a:xfrm>
-          <a:prstGeom prst="rect">
-            <a:avLst/>
-          </a:prstGeom>
-          <a:noFill/>
-        </p:spPr>
-        <p:txBody>
-          <a:bodyPr wrap="square" rtlCol="0">
-            <a:spAutoFit/>
-          </a:bodyPr>
-          <a:lstStyle/>
-          <a:p>
-            <a:r>
-              <a:rPr lang="en-CA" dirty="0"/>
-              <a:t>INFO-6020 Graphics 2, Winter 2023, </a:t>
-            </a:r>
-            <a:r>
-              <a:rPr lang="en-CA" dirty="0">
-                <a:hlinkClick r:id="rId2"/>
-              </a:rPr>
-              <a:t>mfeeney@fanshawec.ca</a:t>
-            </a:r>
-            <a:r>
-              <a:rPr lang="en-CA" dirty="0"/>
-              <a:t>, Michael Feeney</a:t>
-            </a:r>
-          </a:p>
-        </p:txBody>
-      </p:sp>
-    </p:spTree>
-  </p:cSld>
-  <p:clrMapOvr>
-    <a:masterClrMapping/>
-  </p:clrMapOvr>
-  <p:timing>
-    <p:tnLst>
-      <p:par>
-        <p:cTn id="1" dur="indefinite" restart="never" nodeType="tmRoot">
-          <p:childTnLst>
-            <p:seq concurrent="1" nextAc="seek">
-              <p:cTn id="2" dur="indefinite" nodeType="mainSeq">
-                <p:childTnLst>
-                  <p:par>
-                    <p:cTn id="3" fill="hold">
-                      <p:stCondLst>
-                        <p:cond delay="indefinite"/>
-                      </p:stCondLst>
-                      <p:childTnLst>
-                        <p:par>
-                          <p:cTn id="4" fill="hold">
-                            <p:stCondLst>
-                              <p:cond delay="0"/>
-                            </p:stCondLst>
-                            <p:childTnLst>
-                              <p:par>
-                                <p:cTn id="5" presetID="5" presetClass="entr" presetSubtype="10" fill="hold" nodeType="clickEffect">
-                                  <p:stCondLst>
-                                    <p:cond delay="0"/>
-                                  </p:stCondLst>
-                                  <p:childTnLst>
-                                    <p:set>
-                                      <p:cBhvr>
-                                        <p:cTn id="6" dur="1" fill="hold">
-                                          <p:stCondLst>
-                                            <p:cond delay="0"/>
-                                          </p:stCondLst>
-                                        </p:cTn>
-                                        <p:tgtEl>
-                                          <p:spTgt spid="9"/>
-                                        </p:tgtEl>
-                                        <p:attrNameLst>
-                                          <p:attrName>style.visibility</p:attrName>
-                                        </p:attrNameLst>
-                                      </p:cBhvr>
-                                      <p:to>
-                                        <p:strVal val="visible"/>
-                                      </p:to>
-                                    </p:set>
-                                    <p:animEffect transition="in" filter="checkerboard(across)">
-                                      <p:cBhvr>
-                                        <p:cTn id="7" dur="1000"/>
-                                        <p:tgtEl>
-                                          <p:spTgt spid="9"/>
-                                        </p:tgtEl>
-                                      </p:cBhvr>
-                                    </p:animEffect>
-                                  </p:childTnLst>
-                                </p:cTn>
-                              </p:par>
-                            </p:childTnLst>
-                          </p:cTn>
-                        </p:par>
-                      </p:childTnLst>
-                    </p:cTn>
-                  </p:par>
-                </p:childTnLst>
-              </p:cTn>
-              <p:prevCondLst>
-                <p:cond evt="onPrev" delay="0">
-                  <p:tgtEl>
-                    <p:sldTgt/>
-                  </p:tgtEl>
-                </p:cond>
-              </p:prevCondLst>
-              <p:nextCondLst>
-                <p:cond evt="onNext" delay="0">
-                  <p:tgtEl>
-                    <p:sldTgt/>
-                  </p:tgtEl>
-                </p:cond>
-              </p:nextCondLst>
-            </p:seq>
-          </p:childTnLst>
-        </p:cTn>
-      </p:par>
-    </p:tnLst>
-  </p:timing>
-</p:sld>
-</file>
-
-<file path=ppt/slides/slide5.xml><?xml version="1.0" encoding="utf-8"?>
-<p:sld xmlns:a="http://schemas.openxmlformats.org/drawingml/2006/main" xmlns:r="http://schemas.openxmlformats.org/officeDocument/2006/relationships" xmlns:p="http://schemas.openxmlformats.org/presentationml/2006/main">
-  <p:cSld>
-    <p:spTree>
-      <p:nvGrpSpPr>
-        <p:cNvPr id="1" name=""/>
-        <p:cNvGrpSpPr/>
-        <p:nvPr/>
-      </p:nvGrpSpPr>
-      <p:grpSpPr>
-        <a:xfrm>
-          <a:off x="0" y="0"/>
-          <a:ext cx="0" cy="0"/>
-          <a:chOff x="0" y="0"/>
-          <a:chExt cx="0" cy="0"/>
-        </a:xfrm>
-      </p:grpSpPr>
-      <p:sp>
-        <p:nvSpPr>
-          <p:cNvPr id="7" name="Title 6"/>
-          <p:cNvSpPr>
-            <a:spLocks noGrp="1"/>
-          </p:cNvSpPr>
-          <p:nvPr>
-            <p:ph type="title"/>
-          </p:nvPr>
-        </p:nvSpPr>
-        <p:spPr/>
-        <p:txBody>
-          <a:bodyPr>
-            <a:normAutofit/>
-          </a:bodyPr>
-          <a:lstStyle/>
-          <a:p>
-            <a:r>
-              <a:rPr lang="en-CA" dirty="0"/>
-              <a:t>Environment</a:t>
-            </a:r>
-          </a:p>
-        </p:txBody>
-      </p:sp>
-      <p:sp>
-        <p:nvSpPr>
-          <p:cNvPr id="8" name="Content Placeholder 7"/>
-          <p:cNvSpPr>
-            <a:spLocks noGrp="1"/>
-          </p:cNvSpPr>
-          <p:nvPr>
-            <p:ph idx="1"/>
-          </p:nvPr>
-        </p:nvSpPr>
-        <p:spPr/>
-        <p:txBody>
-          <a:bodyPr>
-            <a:normAutofit/>
-          </a:bodyPr>
-          <a:lstStyle/>
-          <a:p>
-            <a:r>
-              <a:rPr lang="en-CA" dirty="0"/>
-              <a:t>C++ (“modern” C++ stuff is frowned upon)</a:t>
-            </a:r>
-          </a:p>
-          <a:p>
-            <a:r>
-              <a:rPr lang="en-CA" dirty="0"/>
-              <a:t>Visual Studio 2022</a:t>
-            </a:r>
-          </a:p>
-          <a:p>
-            <a:r>
-              <a:rPr lang="en-CA" dirty="0"/>
-              <a:t>OpenGL (4.x+)</a:t>
-            </a:r>
+              <a:t>Size or volume that they are created from</a:t>
+            </a:r>
+          </a:p>
+          <a:p>
+            <a:pPr lvl="1"/>
+            <a:r>
+              <a:rPr lang="en-CA" sz="2400" dirty="0"/>
+              <a:t>Starting velocity, etc.</a:t>
+            </a:r>
+          </a:p>
+          <a:p>
+            <a:pPr lvl="1"/>
+            <a:r>
+              <a:rPr lang="en-CA" sz="2400" dirty="0"/>
+              <a:t>May have gravity or some other “constant force”</a:t>
+            </a:r>
+          </a:p>
+          <a:p>
+            <a:r>
+              <a:rPr lang="en-CA" sz="2800" dirty="0"/>
+              <a:t>All points, but may have: size, orientation, etc.</a:t>
+            </a:r>
+          </a:p>
+          <a:p>
+            <a:r>
+              <a:rPr lang="en-CA" sz="2800" dirty="0"/>
+              <a:t>Lifetime per particle</a:t>
+            </a:r>
+          </a:p>
+          <a:p>
+            <a:r>
+              <a:rPr lang="en-CA" sz="2800" dirty="0"/>
+              <a:t>Maybe colours, etc.</a:t>
+            </a:r>
+          </a:p>
+          <a:p>
+            <a:r>
+              <a:rPr lang="en-CA" sz="2800" dirty="0"/>
+              <a:t>Any of these things could be randomized</a:t>
+            </a:r>
+          </a:p>
+          <a:p>
+            <a:endParaRPr lang="en-CA" sz="2800" dirty="0"/>
           </a:p>
           <a:p>
             <a:endParaRPr lang="en-CA" dirty="0"/>
@@ -7877,311 +4454,9 @@
     </p:spTree>
     <p:extLst>
       <p:ext uri="{BB962C8B-B14F-4D97-AF65-F5344CB8AC3E}">
-        <p14:creationId xmlns:p14="http://schemas.microsoft.com/office/powerpoint/2010/main" val="1483520627"/>
+        <p14:creationId xmlns:p14="http://schemas.microsoft.com/office/powerpoint/2010/main" val="3106030017"/>
       </p:ext>
     </p:extLst>
-  </p:cSld>
-  <p:clrMapOvr>
-    <a:masterClrMapping/>
-  </p:clrMapOvr>
-</p:sld>
-</file>
-
-<file path=ppt/slides/slide6.xml><?xml version="1.0" encoding="utf-8"?>
-<p:sld xmlns:a="http://schemas.openxmlformats.org/drawingml/2006/main" xmlns:r="http://schemas.openxmlformats.org/officeDocument/2006/relationships" xmlns:p="http://schemas.openxmlformats.org/presentationml/2006/main">
-  <p:cSld>
-    <p:spTree>
-      <p:nvGrpSpPr>
-        <p:cNvPr id="1" name=""/>
-        <p:cNvGrpSpPr/>
-        <p:nvPr/>
-      </p:nvGrpSpPr>
-      <p:grpSpPr>
-        <a:xfrm>
-          <a:off x="0" y="0"/>
-          <a:ext cx="0" cy="0"/>
-          <a:chOff x="0" y="0"/>
-          <a:chExt cx="0" cy="0"/>
-        </a:xfrm>
-      </p:grpSpPr>
-      <p:sp>
-        <p:nvSpPr>
-          <p:cNvPr id="7" name="Title 6"/>
-          <p:cNvSpPr>
-            <a:spLocks noGrp="1"/>
-          </p:cNvSpPr>
-          <p:nvPr>
-            <p:ph type="title"/>
-          </p:nvPr>
-        </p:nvSpPr>
-        <p:spPr/>
-        <p:txBody>
-          <a:bodyPr>
-            <a:normAutofit/>
-          </a:bodyPr>
-          <a:lstStyle/>
-          <a:p>
-            <a:r>
-              <a:rPr lang="en-CA" dirty="0"/>
-              <a:t>How do I pass?</a:t>
-            </a:r>
-          </a:p>
-        </p:txBody>
-      </p:sp>
-      <p:sp>
-        <p:nvSpPr>
-          <p:cNvPr id="8" name="Content Placeholder 7"/>
-          <p:cNvSpPr>
-            <a:spLocks noGrp="1"/>
-          </p:cNvSpPr>
-          <p:nvPr>
-            <p:ph idx="1"/>
-          </p:nvPr>
-        </p:nvSpPr>
-        <p:spPr/>
-        <p:txBody>
-          <a:bodyPr>
-            <a:normAutofit/>
-          </a:bodyPr>
-          <a:lstStyle/>
-          <a:p>
-            <a:pPr marL="285750" indent="-285750">
-              <a:buFont typeface="Arial" pitchFamily="34" charset="0"/>
-              <a:buChar char="•"/>
-            </a:pPr>
-            <a:r>
-              <a:rPr lang="en-CA" dirty="0"/>
-              <a:t>60/40  Practical Assignments / Theory Exam</a:t>
-            </a:r>
-          </a:p>
-          <a:p>
-            <a:r>
-              <a:rPr lang="en-CA" sz="2600" dirty="0"/>
-              <a:t>Project #1: 20%</a:t>
-            </a:r>
-          </a:p>
-          <a:p>
-            <a:r>
-              <a:rPr lang="en-CA" sz="2600" dirty="0"/>
-              <a:t>Game Jam project #2: 20%</a:t>
-            </a:r>
-          </a:p>
-          <a:p>
-            <a:r>
-              <a:rPr lang="en-CA" sz="2600" dirty="0"/>
-              <a:t>Mid-term exam: 30%</a:t>
-            </a:r>
-          </a:p>
-          <a:p>
-            <a:r>
-              <a:rPr lang="en-CA" sz="2600" dirty="0"/>
-              <a:t>Final exam: 30%  (may be combined with Jam)</a:t>
-            </a:r>
-          </a:p>
-          <a:p>
-            <a:endParaRPr lang="en-CA" sz="2600" dirty="0"/>
-          </a:p>
-          <a:p>
-            <a:r>
-              <a:rPr lang="en-CA" sz="2600" dirty="0"/>
-              <a:t>You must pass the exam </a:t>
-            </a:r>
-            <a:r>
-              <a:rPr lang="en-CA" sz="2600" u="sng" dirty="0"/>
-              <a:t>AND</a:t>
-            </a:r>
-            <a:r>
-              <a:rPr lang="en-CA" sz="2600" dirty="0"/>
-              <a:t> project portion to pass</a:t>
-            </a:r>
-          </a:p>
-          <a:p>
-            <a:endParaRPr lang="en-CA" dirty="0"/>
-          </a:p>
-        </p:txBody>
-      </p:sp>
-    </p:spTree>
-    <p:extLst>
-      <p:ext uri="{BB962C8B-B14F-4D97-AF65-F5344CB8AC3E}">
-        <p14:creationId xmlns:p14="http://schemas.microsoft.com/office/powerpoint/2010/main" val="2594262983"/>
-      </p:ext>
-    </p:extLst>
-  </p:cSld>
-  <p:clrMapOvr>
-    <a:masterClrMapping/>
-  </p:clrMapOvr>
-</p:sld>
-</file>
-
-<file path=ppt/slides/slide7.xml><?xml version="1.0" encoding="utf-8"?>
-<p:sld xmlns:a="http://schemas.openxmlformats.org/drawingml/2006/main" xmlns:r="http://schemas.openxmlformats.org/officeDocument/2006/relationships" xmlns:p="http://schemas.openxmlformats.org/presentationml/2006/main">
-  <p:cSld>
-    <p:spTree>
-      <p:nvGrpSpPr>
-        <p:cNvPr id="1" name=""/>
-        <p:cNvGrpSpPr/>
-        <p:nvPr/>
-      </p:nvGrpSpPr>
-      <p:grpSpPr>
-        <a:xfrm>
-          <a:off x="0" y="0"/>
-          <a:ext cx="0" cy="0"/>
-          <a:chOff x="0" y="0"/>
-          <a:chExt cx="0" cy="0"/>
-        </a:xfrm>
-      </p:grpSpPr>
-      <p:pic>
-        <p:nvPicPr>
-          <p:cNvPr id="1026" name="Picture 2"/>
-          <p:cNvPicPr>
-            <a:picLocks noChangeAspect="1" noChangeArrowheads="1"/>
-          </p:cNvPicPr>
-          <p:nvPr/>
-        </p:nvPicPr>
-        <p:blipFill>
-          <a:blip r:embed="rId2" cstate="print"/>
-          <a:srcRect/>
-          <a:stretch>
-            <a:fillRect/>
-          </a:stretch>
-        </p:blipFill>
-        <p:spPr bwMode="auto">
-          <a:xfrm>
-            <a:off x="304800" y="209550"/>
-            <a:ext cx="8534400" cy="4822630"/>
-          </a:xfrm>
-          <a:prstGeom prst="rect">
-            <a:avLst/>
-          </a:prstGeom>
-          <a:noFill/>
-          <a:ln w="9525">
-            <a:noFill/>
-            <a:miter lim="800000"/>
-            <a:headEnd/>
-            <a:tailEnd/>
-          </a:ln>
-          <a:effectLst/>
-        </p:spPr>
-      </p:pic>
-      <p:sp>
-        <p:nvSpPr>
-          <p:cNvPr id="3" name="TextBox 2"/>
-          <p:cNvSpPr txBox="1"/>
-          <p:nvPr/>
-        </p:nvSpPr>
-        <p:spPr>
-          <a:xfrm>
-            <a:off x="5715000" y="361950"/>
-            <a:ext cx="3124200" cy="830997"/>
-          </a:xfrm>
-          <a:prstGeom prst="rect">
-            <a:avLst/>
-          </a:prstGeom>
-          <a:noFill/>
-          <a:ln>
-            <a:solidFill>
-              <a:schemeClr val="bg1"/>
-            </a:solidFill>
-          </a:ln>
-        </p:spPr>
-        <p:txBody>
-          <a:bodyPr wrap="square" rtlCol="0">
-            <a:spAutoFit/>
-          </a:bodyPr>
-          <a:lstStyle/>
-          <a:p>
-            <a:pPr>
-              <a:buFont typeface="Arial" pitchFamily="34" charset="0"/>
-              <a:buChar char="•"/>
-            </a:pPr>
-            <a:r>
-              <a:rPr lang="en-CA" sz="1200" dirty="0">
-                <a:solidFill>
-                  <a:schemeClr val="bg1"/>
-                </a:solidFill>
-                <a:latin typeface="Arial" pitchFamily="34" charset="0"/>
-                <a:cs typeface="Arial" pitchFamily="34" charset="0"/>
-              </a:rPr>
-              <a:t> Aug. 2014: 4.5 added DX11 extensions   </a:t>
-            </a:r>
-            <a:br>
-              <a:rPr lang="en-CA" sz="1200" dirty="0">
-                <a:solidFill>
-                  <a:schemeClr val="bg1"/>
-                </a:solidFill>
-                <a:latin typeface="Arial" pitchFamily="34" charset="0"/>
-                <a:cs typeface="Arial" pitchFamily="34" charset="0"/>
-              </a:rPr>
-            </a:br>
-            <a:r>
-              <a:rPr lang="en-CA" sz="1200" dirty="0">
-                <a:solidFill>
-                  <a:schemeClr val="bg1"/>
-                </a:solidFill>
-                <a:latin typeface="Arial" pitchFamily="34" charset="0"/>
-                <a:cs typeface="Arial" pitchFamily="34" charset="0"/>
-              </a:rPr>
-              <a:t>  (and many alternative calls)</a:t>
-            </a:r>
-          </a:p>
-          <a:p>
-            <a:pPr>
-              <a:buFont typeface="Arial" pitchFamily="34" charset="0"/>
-              <a:buChar char="•"/>
-            </a:pPr>
-            <a:r>
-              <a:rPr lang="en-CA" sz="1200" dirty="0">
-                <a:solidFill>
-                  <a:schemeClr val="bg1"/>
-                </a:solidFill>
-                <a:latin typeface="Arial" pitchFamily="34" charset="0"/>
-                <a:cs typeface="Arial" pitchFamily="34" charset="0"/>
-              </a:rPr>
-              <a:t> July, 2017: 4.6 added SPIR-V </a:t>
-            </a:r>
-            <a:br>
-              <a:rPr lang="en-CA" sz="1200" dirty="0">
-                <a:solidFill>
-                  <a:schemeClr val="bg1"/>
-                </a:solidFill>
-                <a:latin typeface="Arial" pitchFamily="34" charset="0"/>
-                <a:cs typeface="Arial" pitchFamily="34" charset="0"/>
-              </a:rPr>
-            </a:br>
-            <a:r>
-              <a:rPr lang="en-CA" sz="1200" dirty="0">
-                <a:solidFill>
-                  <a:schemeClr val="bg1"/>
-                </a:solidFill>
-                <a:latin typeface="Arial" pitchFamily="34" charset="0"/>
-                <a:cs typeface="Arial" pitchFamily="34" charset="0"/>
-              </a:rPr>
-              <a:t>  (what </a:t>
-            </a:r>
-            <a:r>
-              <a:rPr lang="en-CA" sz="1200" dirty="0" err="1">
-                <a:solidFill>
-                  <a:schemeClr val="bg1"/>
-                </a:solidFill>
-                <a:latin typeface="Arial" pitchFamily="34" charset="0"/>
-                <a:cs typeface="Arial" pitchFamily="34" charset="0"/>
-              </a:rPr>
-              <a:t>Vulkan</a:t>
-            </a:r>
-            <a:r>
-              <a:rPr lang="en-CA" sz="1200" dirty="0">
-                <a:solidFill>
-                  <a:schemeClr val="bg1"/>
-                </a:solidFill>
-                <a:latin typeface="Arial" pitchFamily="34" charset="0"/>
-                <a:cs typeface="Arial" pitchFamily="34" charset="0"/>
-              </a:rPr>
-              <a:t> uses)</a:t>
-            </a:r>
-          </a:p>
-        </p:txBody>
-      </p:sp>
-    </p:spTree>
   </p:cSld>
   <p:clrMapOvr>
     <a:masterClrMapping/>

</xml_diff>